<commit_message>
Add a lot of files
</commit_message>
<xml_diff>
--- a/report/ИУ7-62Б-Новиков-Артём-БД-През.pptx
+++ b/report/ИУ7-62Б-Новиков-Артём-БД-През.pptx
@@ -58,7 +58,7 @@
         <p:txBody>
           <a:bodyPr/>
           <a:p>
-            <a:fld id="{175D1565-6DE5-427E-89D4-83E9E08D3CAA}" type="slidenum">
+            <a:fld id="{ACF3B14A-2798-43A0-86C0-397050A17310}" type="slidenum">
               <a:t>&lt;#&gt;</a:t>
             </a:fld>
           </a:p>
@@ -98,8 +98,8 @@
         </p:nvSpPr>
         <p:spPr>
           <a:xfrm>
-            <a:off x="609480" y="273600"/>
-            <a:ext cx="10972440" cy="1144800"/>
+            <a:off x="609480" y="221040"/>
+            <a:ext cx="10972440" cy="1250280"/>
           </a:xfrm>
           <a:prstGeom prst="rect">
             <a:avLst/>
@@ -114,10 +114,10 @@
             <a:noAutofit/>
           </a:bodyPr>
           <a:p>
-            <a:endParaRPr b="0" lang="ru-RU" sz="1800" spc="-1" strike="noStrike">
-              <a:solidFill>
-                <a:srgbClr val="000000"/>
-              </a:solidFill>
+            <a:pPr algn="ctr">
+              <a:buNone/>
+            </a:pPr>
+            <a:endParaRPr b="0" lang="ru-RU" sz="4400" spc="-1" strike="noStrike">
               <a:latin typeface="Arial"/>
             </a:endParaRPr>
           </a:p>
@@ -151,19 +151,7 @@
             <a:normAutofit/>
           </a:bodyPr>
           <a:p>
-            <a:pPr>
-              <a:lnSpc>
-                <a:spcPct val="90000"/>
-              </a:lnSpc>
-              <a:spcBef>
-                <a:spcPts val="1417"/>
-              </a:spcBef>
-              <a:buNone/>
-            </a:pPr>
-            <a:endParaRPr b="0" lang="ru-RU" sz="2800" spc="-1" strike="noStrike">
-              <a:solidFill>
-                <a:srgbClr val="000000"/>
-              </a:solidFill>
+            <a:endParaRPr b="0" lang="ru-RU" sz="3200" spc="-1" strike="noStrike">
               <a:latin typeface="Arial"/>
             </a:endParaRPr>
           </a:p>
@@ -197,19 +185,7 @@
             <a:normAutofit/>
           </a:bodyPr>
           <a:p>
-            <a:pPr>
-              <a:lnSpc>
-                <a:spcPct val="90000"/>
-              </a:lnSpc>
-              <a:spcBef>
-                <a:spcPts val="1417"/>
-              </a:spcBef>
-              <a:buNone/>
-            </a:pPr>
-            <a:endParaRPr b="0" lang="ru-RU" sz="2800" spc="-1" strike="noStrike">
-              <a:solidFill>
-                <a:srgbClr val="000000"/>
-              </a:solidFill>
+            <a:endParaRPr b="0" lang="ru-RU" sz="3200" spc="-1" strike="noStrike">
               <a:latin typeface="Arial"/>
             </a:endParaRPr>
           </a:p>
@@ -229,7 +205,7 @@
         <p:txBody>
           <a:bodyPr/>
           <a:p>
-            <a:fld id="{05DE38FD-3D00-41D2-8FE1-42304E450DB0}" type="slidenum">
+            <a:fld id="{E8AFD28E-8EFA-48F9-A03C-5C4192F6BA51}" type="slidenum">
               <a:t>&lt;#&gt;</a:t>
             </a:fld>
           </a:p>
@@ -269,8 +245,8 @@
         </p:nvSpPr>
         <p:spPr>
           <a:xfrm>
-            <a:off x="609480" y="273600"/>
-            <a:ext cx="10972440" cy="1144800"/>
+            <a:off x="609480" y="221040"/>
+            <a:ext cx="10972440" cy="1250280"/>
           </a:xfrm>
           <a:prstGeom prst="rect">
             <a:avLst/>
@@ -285,10 +261,10 @@
             <a:noAutofit/>
           </a:bodyPr>
           <a:p>
-            <a:endParaRPr b="0" lang="ru-RU" sz="1800" spc="-1" strike="noStrike">
-              <a:solidFill>
-                <a:srgbClr val="000000"/>
-              </a:solidFill>
+            <a:pPr algn="ctr">
+              <a:buNone/>
+            </a:pPr>
+            <a:endParaRPr b="0" lang="ru-RU" sz="4400" spc="-1" strike="noStrike">
               <a:latin typeface="Arial"/>
             </a:endParaRPr>
           </a:p>
@@ -322,19 +298,7 @@
             <a:normAutofit/>
           </a:bodyPr>
           <a:p>
-            <a:pPr>
-              <a:lnSpc>
-                <a:spcPct val="90000"/>
-              </a:lnSpc>
-              <a:spcBef>
-                <a:spcPts val="1417"/>
-              </a:spcBef>
-              <a:buNone/>
-            </a:pPr>
-            <a:endParaRPr b="0" lang="ru-RU" sz="2800" spc="-1" strike="noStrike">
-              <a:solidFill>
-                <a:srgbClr val="000000"/>
-              </a:solidFill>
+            <a:endParaRPr b="0" lang="ru-RU" sz="3200" spc="-1" strike="noStrike">
               <a:latin typeface="Arial"/>
             </a:endParaRPr>
           </a:p>
@@ -368,19 +332,7 @@
             <a:normAutofit/>
           </a:bodyPr>
           <a:p>
-            <a:pPr>
-              <a:lnSpc>
-                <a:spcPct val="90000"/>
-              </a:lnSpc>
-              <a:spcBef>
-                <a:spcPts val="1417"/>
-              </a:spcBef>
-              <a:buNone/>
-            </a:pPr>
-            <a:endParaRPr b="0" lang="ru-RU" sz="2800" spc="-1" strike="noStrike">
-              <a:solidFill>
-                <a:srgbClr val="000000"/>
-              </a:solidFill>
+            <a:endParaRPr b="0" lang="ru-RU" sz="3200" spc="-1" strike="noStrike">
               <a:latin typeface="Arial"/>
             </a:endParaRPr>
           </a:p>
@@ -414,19 +366,7 @@
             <a:normAutofit/>
           </a:bodyPr>
           <a:p>
-            <a:pPr>
-              <a:lnSpc>
-                <a:spcPct val="90000"/>
-              </a:lnSpc>
-              <a:spcBef>
-                <a:spcPts val="1417"/>
-              </a:spcBef>
-              <a:buNone/>
-            </a:pPr>
-            <a:endParaRPr b="0" lang="ru-RU" sz="2800" spc="-1" strike="noStrike">
-              <a:solidFill>
-                <a:srgbClr val="000000"/>
-              </a:solidFill>
+            <a:endParaRPr b="0" lang="ru-RU" sz="3200" spc="-1" strike="noStrike">
               <a:latin typeface="Arial"/>
             </a:endParaRPr>
           </a:p>
@@ -460,19 +400,7 @@
             <a:normAutofit/>
           </a:bodyPr>
           <a:p>
-            <a:pPr>
-              <a:lnSpc>
-                <a:spcPct val="90000"/>
-              </a:lnSpc>
-              <a:spcBef>
-                <a:spcPts val="1417"/>
-              </a:spcBef>
-              <a:buNone/>
-            </a:pPr>
-            <a:endParaRPr b="0" lang="ru-RU" sz="2800" spc="-1" strike="noStrike">
-              <a:solidFill>
-                <a:srgbClr val="000000"/>
-              </a:solidFill>
+            <a:endParaRPr b="0" lang="ru-RU" sz="3200" spc="-1" strike="noStrike">
               <a:latin typeface="Arial"/>
             </a:endParaRPr>
           </a:p>
@@ -492,7 +420,7 @@
         <p:txBody>
           <a:bodyPr/>
           <a:p>
-            <a:fld id="{3430FF84-9DF8-4DF2-AD37-DCAF5CD3C44D}" type="slidenum">
+            <a:fld id="{B9AD0903-669A-4546-8D3B-766CF5019464}" type="slidenum">
               <a:t>&lt;#&gt;</a:t>
             </a:fld>
           </a:p>
@@ -532,8 +460,8 @@
         </p:nvSpPr>
         <p:spPr>
           <a:xfrm>
-            <a:off x="609480" y="273600"/>
-            <a:ext cx="10972440" cy="1144800"/>
+            <a:off x="609480" y="221040"/>
+            <a:ext cx="10972440" cy="1250280"/>
           </a:xfrm>
           <a:prstGeom prst="rect">
             <a:avLst/>
@@ -548,10 +476,10 @@
             <a:noAutofit/>
           </a:bodyPr>
           <a:p>
-            <a:endParaRPr b="0" lang="ru-RU" sz="1800" spc="-1" strike="noStrike">
-              <a:solidFill>
-                <a:srgbClr val="000000"/>
-              </a:solidFill>
+            <a:pPr algn="ctr">
+              <a:buNone/>
+            </a:pPr>
+            <a:endParaRPr b="0" lang="ru-RU" sz="4400" spc="-1" strike="noStrike">
               <a:latin typeface="Arial"/>
             </a:endParaRPr>
           </a:p>
@@ -582,22 +510,10 @@
         </p:spPr>
         <p:txBody>
           <a:bodyPr lIns="0" rIns="0" tIns="0" bIns="0" anchor="t">
-            <a:normAutofit/>
-          </a:bodyPr>
-          <a:p>
-            <a:pPr>
-              <a:lnSpc>
-                <a:spcPct val="90000"/>
-              </a:lnSpc>
-              <a:spcBef>
-                <a:spcPts val="1417"/>
-              </a:spcBef>
-              <a:buNone/>
-            </a:pPr>
-            <a:endParaRPr b="0" lang="ru-RU" sz="2800" spc="-1" strike="noStrike">
-              <a:solidFill>
-                <a:srgbClr val="000000"/>
-              </a:solidFill>
+            <a:normAutofit fontScale="91000"/>
+          </a:bodyPr>
+          <a:p>
+            <a:endParaRPr b="0" lang="ru-RU" sz="3200" spc="-1" strike="noStrike">
               <a:latin typeface="Arial"/>
             </a:endParaRPr>
           </a:p>
@@ -628,22 +544,10 @@
         </p:spPr>
         <p:txBody>
           <a:bodyPr lIns="0" rIns="0" tIns="0" bIns="0" anchor="t">
-            <a:normAutofit/>
-          </a:bodyPr>
-          <a:p>
-            <a:pPr>
-              <a:lnSpc>
-                <a:spcPct val="90000"/>
-              </a:lnSpc>
-              <a:spcBef>
-                <a:spcPts val="1417"/>
-              </a:spcBef>
-              <a:buNone/>
-            </a:pPr>
-            <a:endParaRPr b="0" lang="ru-RU" sz="2800" spc="-1" strike="noStrike">
-              <a:solidFill>
-                <a:srgbClr val="000000"/>
-              </a:solidFill>
+            <a:normAutofit fontScale="91000"/>
+          </a:bodyPr>
+          <a:p>
+            <a:endParaRPr b="0" lang="ru-RU" sz="3200" spc="-1" strike="noStrike">
               <a:latin typeface="Arial"/>
             </a:endParaRPr>
           </a:p>
@@ -674,22 +578,10 @@
         </p:spPr>
         <p:txBody>
           <a:bodyPr lIns="0" rIns="0" tIns="0" bIns="0" anchor="t">
-            <a:normAutofit/>
-          </a:bodyPr>
-          <a:p>
-            <a:pPr>
-              <a:lnSpc>
-                <a:spcPct val="90000"/>
-              </a:lnSpc>
-              <a:spcBef>
-                <a:spcPts val="1417"/>
-              </a:spcBef>
-              <a:buNone/>
-            </a:pPr>
-            <a:endParaRPr b="0" lang="ru-RU" sz="2800" spc="-1" strike="noStrike">
-              <a:solidFill>
-                <a:srgbClr val="000000"/>
-              </a:solidFill>
+            <a:normAutofit fontScale="91000"/>
+          </a:bodyPr>
+          <a:p>
+            <a:endParaRPr b="0" lang="ru-RU" sz="3200" spc="-1" strike="noStrike">
               <a:latin typeface="Arial"/>
             </a:endParaRPr>
           </a:p>
@@ -720,22 +612,10 @@
         </p:spPr>
         <p:txBody>
           <a:bodyPr lIns="0" rIns="0" tIns="0" bIns="0" anchor="t">
-            <a:normAutofit/>
-          </a:bodyPr>
-          <a:p>
-            <a:pPr>
-              <a:lnSpc>
-                <a:spcPct val="90000"/>
-              </a:lnSpc>
-              <a:spcBef>
-                <a:spcPts val="1417"/>
-              </a:spcBef>
-              <a:buNone/>
-            </a:pPr>
-            <a:endParaRPr b="0" lang="ru-RU" sz="2800" spc="-1" strike="noStrike">
-              <a:solidFill>
-                <a:srgbClr val="000000"/>
-              </a:solidFill>
+            <a:normAutofit fontScale="91000"/>
+          </a:bodyPr>
+          <a:p>
+            <a:endParaRPr b="0" lang="ru-RU" sz="3200" spc="-1" strike="noStrike">
               <a:latin typeface="Arial"/>
             </a:endParaRPr>
           </a:p>
@@ -766,22 +646,10 @@
         </p:spPr>
         <p:txBody>
           <a:bodyPr lIns="0" rIns="0" tIns="0" bIns="0" anchor="t">
-            <a:normAutofit/>
-          </a:bodyPr>
-          <a:p>
-            <a:pPr>
-              <a:lnSpc>
-                <a:spcPct val="90000"/>
-              </a:lnSpc>
-              <a:spcBef>
-                <a:spcPts val="1417"/>
-              </a:spcBef>
-              <a:buNone/>
-            </a:pPr>
-            <a:endParaRPr b="0" lang="ru-RU" sz="2800" spc="-1" strike="noStrike">
-              <a:solidFill>
-                <a:srgbClr val="000000"/>
-              </a:solidFill>
+            <a:normAutofit fontScale="91000"/>
+          </a:bodyPr>
+          <a:p>
+            <a:endParaRPr b="0" lang="ru-RU" sz="3200" spc="-1" strike="noStrike">
               <a:latin typeface="Arial"/>
             </a:endParaRPr>
           </a:p>
@@ -812,22 +680,10 @@
         </p:spPr>
         <p:txBody>
           <a:bodyPr lIns="0" rIns="0" tIns="0" bIns="0" anchor="t">
-            <a:normAutofit/>
-          </a:bodyPr>
-          <a:p>
-            <a:pPr>
-              <a:lnSpc>
-                <a:spcPct val="90000"/>
-              </a:lnSpc>
-              <a:spcBef>
-                <a:spcPts val="1417"/>
-              </a:spcBef>
-              <a:buNone/>
-            </a:pPr>
-            <a:endParaRPr b="0" lang="ru-RU" sz="2800" spc="-1" strike="noStrike">
-              <a:solidFill>
-                <a:srgbClr val="000000"/>
-              </a:solidFill>
+            <a:normAutofit fontScale="91000"/>
+          </a:bodyPr>
+          <a:p>
+            <a:endParaRPr b="0" lang="ru-RU" sz="3200" spc="-1" strike="noStrike">
               <a:latin typeface="Arial"/>
             </a:endParaRPr>
           </a:p>
@@ -847,7 +703,7 @@
         <p:txBody>
           <a:bodyPr/>
           <a:p>
-            <a:fld id="{0C29D737-30BD-4DB7-8B04-34BABA7B3A5F}" type="slidenum">
+            <a:fld id="{DA974A43-68D1-4013-B88F-2E64FC9F2AF4}" type="slidenum">
               <a:t>&lt;#&gt;</a:t>
             </a:fld>
           </a:p>
@@ -889,7 +745,7 @@
         <p:txBody>
           <a:bodyPr/>
           <a:p>
-            <a:fld id="{BF92BAB5-B68D-4FB5-9C65-BDD77C1583D5}" type="slidenum">
+            <a:fld id="{CFE6CE37-94BA-4E26-A62F-717A92CDBD70}" type="slidenum">
               <a:t>&lt;#&gt;</a:t>
             </a:fld>
           </a:p>
@@ -929,8 +785,8 @@
         </p:nvSpPr>
         <p:spPr>
           <a:xfrm>
-            <a:off x="609480" y="273600"/>
-            <a:ext cx="10972440" cy="1144800"/>
+            <a:off x="609480" y="221040"/>
+            <a:ext cx="10972440" cy="1250280"/>
           </a:xfrm>
           <a:prstGeom prst="rect">
             <a:avLst/>
@@ -945,10 +801,10 @@
             <a:noAutofit/>
           </a:bodyPr>
           <a:p>
-            <a:endParaRPr b="0" lang="ru-RU" sz="1800" spc="-1" strike="noStrike">
-              <a:solidFill>
-                <a:srgbClr val="000000"/>
-              </a:solidFill>
+            <a:pPr algn="ctr">
+              <a:buNone/>
+            </a:pPr>
+            <a:endParaRPr b="0" lang="ru-RU" sz="4400" spc="-1" strike="noStrike">
               <a:latin typeface="Arial"/>
             </a:endParaRPr>
           </a:p>
@@ -1005,7 +861,7 @@
         <p:txBody>
           <a:bodyPr/>
           <a:p>
-            <a:fld id="{22F1186F-C560-477A-9C45-5DCE4871BFE0}" type="slidenum">
+            <a:fld id="{EFF17BE0-5FC9-4BC1-9034-21D1D30CCA61}" type="slidenum">
               <a:t>&lt;#&gt;</a:t>
             </a:fld>
           </a:p>
@@ -1045,8 +901,8 @@
         </p:nvSpPr>
         <p:spPr>
           <a:xfrm>
-            <a:off x="609480" y="273600"/>
-            <a:ext cx="10972440" cy="1144800"/>
+            <a:off x="609480" y="221040"/>
+            <a:ext cx="10972440" cy="1250280"/>
           </a:xfrm>
           <a:prstGeom prst="rect">
             <a:avLst/>
@@ -1061,10 +917,10 @@
             <a:noAutofit/>
           </a:bodyPr>
           <a:p>
-            <a:endParaRPr b="0" lang="ru-RU" sz="1800" spc="-1" strike="noStrike">
-              <a:solidFill>
-                <a:srgbClr val="000000"/>
-              </a:solidFill>
+            <a:pPr algn="ctr">
+              <a:buNone/>
+            </a:pPr>
+            <a:endParaRPr b="0" lang="ru-RU" sz="4400" spc="-1" strike="noStrike">
               <a:latin typeface="Arial"/>
             </a:endParaRPr>
           </a:p>
@@ -1098,19 +954,7 @@
             <a:normAutofit/>
           </a:bodyPr>
           <a:p>
-            <a:pPr>
-              <a:lnSpc>
-                <a:spcPct val="90000"/>
-              </a:lnSpc>
-              <a:spcBef>
-                <a:spcPts val="1417"/>
-              </a:spcBef>
-              <a:buNone/>
-            </a:pPr>
-            <a:endParaRPr b="0" lang="ru-RU" sz="2800" spc="-1" strike="noStrike">
-              <a:solidFill>
-                <a:srgbClr val="000000"/>
-              </a:solidFill>
+            <a:endParaRPr b="0" lang="ru-RU" sz="3200" spc="-1" strike="noStrike">
               <a:latin typeface="Arial"/>
             </a:endParaRPr>
           </a:p>
@@ -1130,7 +974,7 @@
         <p:txBody>
           <a:bodyPr/>
           <a:p>
-            <a:fld id="{7E436056-82FB-4DE1-9471-7D27FF9F7F35}" type="slidenum">
+            <a:fld id="{6168DD66-35B6-4FBF-8EB2-017FDA9A30EB}" type="slidenum">
               <a:t>&lt;#&gt;</a:t>
             </a:fld>
           </a:p>
@@ -1170,8 +1014,8 @@
         </p:nvSpPr>
         <p:spPr>
           <a:xfrm>
-            <a:off x="609480" y="273600"/>
-            <a:ext cx="10972440" cy="1144800"/>
+            <a:off x="609480" y="221040"/>
+            <a:ext cx="10972440" cy="1250280"/>
           </a:xfrm>
           <a:prstGeom prst="rect">
             <a:avLst/>
@@ -1186,10 +1030,10 @@
             <a:noAutofit/>
           </a:bodyPr>
           <a:p>
-            <a:endParaRPr b="0" lang="ru-RU" sz="1800" spc="-1" strike="noStrike">
-              <a:solidFill>
-                <a:srgbClr val="000000"/>
-              </a:solidFill>
+            <a:pPr algn="ctr">
+              <a:buNone/>
+            </a:pPr>
+            <a:endParaRPr b="0" lang="ru-RU" sz="4400" spc="-1" strike="noStrike">
               <a:latin typeface="Arial"/>
             </a:endParaRPr>
           </a:p>
@@ -1223,19 +1067,7 @@
             <a:normAutofit/>
           </a:bodyPr>
           <a:p>
-            <a:pPr>
-              <a:lnSpc>
-                <a:spcPct val="90000"/>
-              </a:lnSpc>
-              <a:spcBef>
-                <a:spcPts val="1417"/>
-              </a:spcBef>
-              <a:buNone/>
-            </a:pPr>
-            <a:endParaRPr b="0" lang="ru-RU" sz="2800" spc="-1" strike="noStrike">
-              <a:solidFill>
-                <a:srgbClr val="000000"/>
-              </a:solidFill>
+            <a:endParaRPr b="0" lang="ru-RU" sz="3200" spc="-1" strike="noStrike">
               <a:latin typeface="Arial"/>
             </a:endParaRPr>
           </a:p>
@@ -1269,19 +1101,7 @@
             <a:normAutofit/>
           </a:bodyPr>
           <a:p>
-            <a:pPr>
-              <a:lnSpc>
-                <a:spcPct val="90000"/>
-              </a:lnSpc>
-              <a:spcBef>
-                <a:spcPts val="1417"/>
-              </a:spcBef>
-              <a:buNone/>
-            </a:pPr>
-            <a:endParaRPr b="0" lang="ru-RU" sz="2800" spc="-1" strike="noStrike">
-              <a:solidFill>
-                <a:srgbClr val="000000"/>
-              </a:solidFill>
+            <a:endParaRPr b="0" lang="ru-RU" sz="3200" spc="-1" strike="noStrike">
               <a:latin typeface="Arial"/>
             </a:endParaRPr>
           </a:p>
@@ -1301,7 +1121,7 @@
         <p:txBody>
           <a:bodyPr/>
           <a:p>
-            <a:fld id="{9ADE4E50-AF1B-4390-8B5B-04590AD90079}" type="slidenum">
+            <a:fld id="{D7E8A5D1-4334-4C3F-8F5F-17D03D899888}" type="slidenum">
               <a:t>&lt;#&gt;</a:t>
             </a:fld>
           </a:p>
@@ -1341,8 +1161,8 @@
         </p:nvSpPr>
         <p:spPr>
           <a:xfrm>
-            <a:off x="609480" y="273600"/>
-            <a:ext cx="10972440" cy="1144800"/>
+            <a:off x="609480" y="221040"/>
+            <a:ext cx="10972440" cy="1250280"/>
           </a:xfrm>
           <a:prstGeom prst="rect">
             <a:avLst/>
@@ -1357,10 +1177,10 @@
             <a:noAutofit/>
           </a:bodyPr>
           <a:p>
-            <a:endParaRPr b="0" lang="ru-RU" sz="1800" spc="-1" strike="noStrike">
-              <a:solidFill>
-                <a:srgbClr val="000000"/>
-              </a:solidFill>
+            <a:pPr algn="ctr">
+              <a:buNone/>
+            </a:pPr>
+            <a:endParaRPr b="0" lang="ru-RU" sz="4400" spc="-1" strike="noStrike">
               <a:latin typeface="Arial"/>
             </a:endParaRPr>
           </a:p>
@@ -1380,7 +1200,7 @@
         <p:txBody>
           <a:bodyPr/>
           <a:p>
-            <a:fld id="{00C35FC6-8433-49C4-B533-537ACE18468F}" type="slidenum">
+            <a:fld id="{53FDAD54-C5D2-474A-9863-635FDB4BD498}" type="slidenum">
               <a:t>&lt;#&gt;</a:t>
             </a:fld>
           </a:p>
@@ -1459,7 +1279,7 @@
         <p:txBody>
           <a:bodyPr/>
           <a:p>
-            <a:fld id="{92759585-56BC-4855-9709-D056A18722E2}" type="slidenum">
+            <a:fld id="{4C5571D4-37AE-49F9-B78D-2B75D46E8AD0}" type="slidenum">
               <a:t>&lt;#&gt;</a:t>
             </a:fld>
           </a:p>
@@ -1499,8 +1319,8 @@
         </p:nvSpPr>
         <p:spPr>
           <a:xfrm>
-            <a:off x="609480" y="273600"/>
-            <a:ext cx="10972440" cy="1144800"/>
+            <a:off x="609480" y="221040"/>
+            <a:ext cx="10972440" cy="1250280"/>
           </a:xfrm>
           <a:prstGeom prst="rect">
             <a:avLst/>
@@ -1515,10 +1335,10 @@
             <a:noAutofit/>
           </a:bodyPr>
           <a:p>
-            <a:endParaRPr b="0" lang="ru-RU" sz="1800" spc="-1" strike="noStrike">
-              <a:solidFill>
-                <a:srgbClr val="000000"/>
-              </a:solidFill>
+            <a:pPr algn="ctr">
+              <a:buNone/>
+            </a:pPr>
+            <a:endParaRPr b="0" lang="ru-RU" sz="4400" spc="-1" strike="noStrike">
               <a:latin typeface="Arial"/>
             </a:endParaRPr>
           </a:p>
@@ -1552,19 +1372,7 @@
             <a:normAutofit/>
           </a:bodyPr>
           <a:p>
-            <a:pPr>
-              <a:lnSpc>
-                <a:spcPct val="90000"/>
-              </a:lnSpc>
-              <a:spcBef>
-                <a:spcPts val="1417"/>
-              </a:spcBef>
-              <a:buNone/>
-            </a:pPr>
-            <a:endParaRPr b="0" lang="ru-RU" sz="2800" spc="-1" strike="noStrike">
-              <a:solidFill>
-                <a:srgbClr val="000000"/>
-              </a:solidFill>
+            <a:endParaRPr b="0" lang="ru-RU" sz="3200" spc="-1" strike="noStrike">
               <a:latin typeface="Arial"/>
             </a:endParaRPr>
           </a:p>
@@ -1598,19 +1406,7 @@
             <a:normAutofit/>
           </a:bodyPr>
           <a:p>
-            <a:pPr>
-              <a:lnSpc>
-                <a:spcPct val="90000"/>
-              </a:lnSpc>
-              <a:spcBef>
-                <a:spcPts val="1417"/>
-              </a:spcBef>
-              <a:buNone/>
-            </a:pPr>
-            <a:endParaRPr b="0" lang="ru-RU" sz="2800" spc="-1" strike="noStrike">
-              <a:solidFill>
-                <a:srgbClr val="000000"/>
-              </a:solidFill>
+            <a:endParaRPr b="0" lang="ru-RU" sz="3200" spc="-1" strike="noStrike">
               <a:latin typeface="Arial"/>
             </a:endParaRPr>
           </a:p>
@@ -1644,19 +1440,7 @@
             <a:normAutofit/>
           </a:bodyPr>
           <a:p>
-            <a:pPr>
-              <a:lnSpc>
-                <a:spcPct val="90000"/>
-              </a:lnSpc>
-              <a:spcBef>
-                <a:spcPts val="1417"/>
-              </a:spcBef>
-              <a:buNone/>
-            </a:pPr>
-            <a:endParaRPr b="0" lang="ru-RU" sz="2800" spc="-1" strike="noStrike">
-              <a:solidFill>
-                <a:srgbClr val="000000"/>
-              </a:solidFill>
+            <a:endParaRPr b="0" lang="ru-RU" sz="3200" spc="-1" strike="noStrike">
               <a:latin typeface="Arial"/>
             </a:endParaRPr>
           </a:p>
@@ -1676,7 +1460,7 @@
         <p:txBody>
           <a:bodyPr/>
           <a:p>
-            <a:fld id="{10032C78-F76D-4588-9AE6-7E48767ECD69}" type="slidenum">
+            <a:fld id="{CCB5D66D-5AC3-4712-8092-FB66DC7E2FD5}" type="slidenum">
               <a:t>&lt;#&gt;</a:t>
             </a:fld>
           </a:p>
@@ -1716,8 +1500,8 @@
         </p:nvSpPr>
         <p:spPr>
           <a:xfrm>
-            <a:off x="609480" y="273600"/>
-            <a:ext cx="10972440" cy="1144800"/>
+            <a:off x="609480" y="221040"/>
+            <a:ext cx="10972440" cy="1250280"/>
           </a:xfrm>
           <a:prstGeom prst="rect">
             <a:avLst/>
@@ -1732,10 +1516,10 @@
             <a:noAutofit/>
           </a:bodyPr>
           <a:p>
-            <a:endParaRPr b="0" lang="ru-RU" sz="1800" spc="-1" strike="noStrike">
-              <a:solidFill>
-                <a:srgbClr val="000000"/>
-              </a:solidFill>
+            <a:pPr algn="ctr">
+              <a:buNone/>
+            </a:pPr>
+            <a:endParaRPr b="0" lang="ru-RU" sz="4400" spc="-1" strike="noStrike">
               <a:latin typeface="Arial"/>
             </a:endParaRPr>
           </a:p>
@@ -1792,7 +1576,7 @@
         <p:txBody>
           <a:bodyPr/>
           <a:p>
-            <a:fld id="{8C9858ED-8FEE-4DC0-8844-1DD925FDEFB2}" type="slidenum">
+            <a:fld id="{F3DF4A18-BA8B-4F9F-9626-6772A807946A}" type="slidenum">
               <a:t>&lt;#&gt;</a:t>
             </a:fld>
           </a:p>
@@ -1832,8 +1616,8 @@
         </p:nvSpPr>
         <p:spPr>
           <a:xfrm>
-            <a:off x="609480" y="273600"/>
-            <a:ext cx="10972440" cy="1144800"/>
+            <a:off x="609480" y="221040"/>
+            <a:ext cx="10972440" cy="1250280"/>
           </a:xfrm>
           <a:prstGeom prst="rect">
             <a:avLst/>
@@ -1848,10 +1632,10 @@
             <a:noAutofit/>
           </a:bodyPr>
           <a:p>
-            <a:endParaRPr b="0" lang="ru-RU" sz="1800" spc="-1" strike="noStrike">
-              <a:solidFill>
-                <a:srgbClr val="000000"/>
-              </a:solidFill>
+            <a:pPr algn="ctr">
+              <a:buNone/>
+            </a:pPr>
+            <a:endParaRPr b="0" lang="ru-RU" sz="4400" spc="-1" strike="noStrike">
               <a:latin typeface="Arial"/>
             </a:endParaRPr>
           </a:p>
@@ -1885,19 +1669,7 @@
             <a:normAutofit/>
           </a:bodyPr>
           <a:p>
-            <a:pPr>
-              <a:lnSpc>
-                <a:spcPct val="90000"/>
-              </a:lnSpc>
-              <a:spcBef>
-                <a:spcPts val="1417"/>
-              </a:spcBef>
-              <a:buNone/>
-            </a:pPr>
-            <a:endParaRPr b="0" lang="ru-RU" sz="2800" spc="-1" strike="noStrike">
-              <a:solidFill>
-                <a:srgbClr val="000000"/>
-              </a:solidFill>
+            <a:endParaRPr b="0" lang="ru-RU" sz="3200" spc="-1" strike="noStrike">
               <a:latin typeface="Arial"/>
             </a:endParaRPr>
           </a:p>
@@ -1931,19 +1703,7 @@
             <a:normAutofit/>
           </a:bodyPr>
           <a:p>
-            <a:pPr>
-              <a:lnSpc>
-                <a:spcPct val="90000"/>
-              </a:lnSpc>
-              <a:spcBef>
-                <a:spcPts val="1417"/>
-              </a:spcBef>
-              <a:buNone/>
-            </a:pPr>
-            <a:endParaRPr b="0" lang="ru-RU" sz="2800" spc="-1" strike="noStrike">
-              <a:solidFill>
-                <a:srgbClr val="000000"/>
-              </a:solidFill>
+            <a:endParaRPr b="0" lang="ru-RU" sz="3200" spc="-1" strike="noStrike">
               <a:latin typeface="Arial"/>
             </a:endParaRPr>
           </a:p>
@@ -1977,19 +1737,7 @@
             <a:normAutofit/>
           </a:bodyPr>
           <a:p>
-            <a:pPr>
-              <a:lnSpc>
-                <a:spcPct val="90000"/>
-              </a:lnSpc>
-              <a:spcBef>
-                <a:spcPts val="1417"/>
-              </a:spcBef>
-              <a:buNone/>
-            </a:pPr>
-            <a:endParaRPr b="0" lang="ru-RU" sz="2800" spc="-1" strike="noStrike">
-              <a:solidFill>
-                <a:srgbClr val="000000"/>
-              </a:solidFill>
+            <a:endParaRPr b="0" lang="ru-RU" sz="3200" spc="-1" strike="noStrike">
               <a:latin typeface="Arial"/>
             </a:endParaRPr>
           </a:p>
@@ -2009,7 +1757,7 @@
         <p:txBody>
           <a:bodyPr/>
           <a:p>
-            <a:fld id="{3F870555-92AD-4DE5-A80A-1CAB9703CD56}" type="slidenum">
+            <a:fld id="{7BF88913-48F1-4097-99F8-E1D4DB42569D}" type="slidenum">
               <a:t>&lt;#&gt;</a:t>
             </a:fld>
           </a:p>
@@ -2049,8 +1797,8 @@
         </p:nvSpPr>
         <p:spPr>
           <a:xfrm>
-            <a:off x="609480" y="273600"/>
-            <a:ext cx="10972440" cy="1144800"/>
+            <a:off x="609480" y="221040"/>
+            <a:ext cx="10972440" cy="1250280"/>
           </a:xfrm>
           <a:prstGeom prst="rect">
             <a:avLst/>
@@ -2065,10 +1813,10 @@
             <a:noAutofit/>
           </a:bodyPr>
           <a:p>
-            <a:endParaRPr b="0" lang="ru-RU" sz="1800" spc="-1" strike="noStrike">
-              <a:solidFill>
-                <a:srgbClr val="000000"/>
-              </a:solidFill>
+            <a:pPr algn="ctr">
+              <a:buNone/>
+            </a:pPr>
+            <a:endParaRPr b="0" lang="ru-RU" sz="4400" spc="-1" strike="noStrike">
               <a:latin typeface="Arial"/>
             </a:endParaRPr>
           </a:p>
@@ -2102,19 +1850,7 @@
             <a:normAutofit/>
           </a:bodyPr>
           <a:p>
-            <a:pPr>
-              <a:lnSpc>
-                <a:spcPct val="90000"/>
-              </a:lnSpc>
-              <a:spcBef>
-                <a:spcPts val="1417"/>
-              </a:spcBef>
-              <a:buNone/>
-            </a:pPr>
-            <a:endParaRPr b="0" lang="ru-RU" sz="2800" spc="-1" strike="noStrike">
-              <a:solidFill>
-                <a:srgbClr val="000000"/>
-              </a:solidFill>
+            <a:endParaRPr b="0" lang="ru-RU" sz="3200" spc="-1" strike="noStrike">
               <a:latin typeface="Arial"/>
             </a:endParaRPr>
           </a:p>
@@ -2148,19 +1884,7 @@
             <a:normAutofit/>
           </a:bodyPr>
           <a:p>
-            <a:pPr>
-              <a:lnSpc>
-                <a:spcPct val="90000"/>
-              </a:lnSpc>
-              <a:spcBef>
-                <a:spcPts val="1417"/>
-              </a:spcBef>
-              <a:buNone/>
-            </a:pPr>
-            <a:endParaRPr b="0" lang="ru-RU" sz="2800" spc="-1" strike="noStrike">
-              <a:solidFill>
-                <a:srgbClr val="000000"/>
-              </a:solidFill>
+            <a:endParaRPr b="0" lang="ru-RU" sz="3200" spc="-1" strike="noStrike">
               <a:latin typeface="Arial"/>
             </a:endParaRPr>
           </a:p>
@@ -2194,19 +1918,7 @@
             <a:normAutofit/>
           </a:bodyPr>
           <a:p>
-            <a:pPr>
-              <a:lnSpc>
-                <a:spcPct val="90000"/>
-              </a:lnSpc>
-              <a:spcBef>
-                <a:spcPts val="1417"/>
-              </a:spcBef>
-              <a:buNone/>
-            </a:pPr>
-            <a:endParaRPr b="0" lang="ru-RU" sz="2800" spc="-1" strike="noStrike">
-              <a:solidFill>
-                <a:srgbClr val="000000"/>
-              </a:solidFill>
+            <a:endParaRPr b="0" lang="ru-RU" sz="3200" spc="-1" strike="noStrike">
               <a:latin typeface="Arial"/>
             </a:endParaRPr>
           </a:p>
@@ -2226,7 +1938,7 @@
         <p:txBody>
           <a:bodyPr/>
           <a:p>
-            <a:fld id="{64BF765D-E9DB-4662-9A0D-B0DBDD01CA03}" type="slidenum">
+            <a:fld id="{9ABFB5BC-ADB4-419B-A1EB-7BF556395ABE}" type="slidenum">
               <a:t>&lt;#&gt;</a:t>
             </a:fld>
           </a:p>
@@ -2266,8 +1978,8 @@
         </p:nvSpPr>
         <p:spPr>
           <a:xfrm>
-            <a:off x="609480" y="273600"/>
-            <a:ext cx="10972440" cy="1144800"/>
+            <a:off x="609480" y="221040"/>
+            <a:ext cx="10972440" cy="1250280"/>
           </a:xfrm>
           <a:prstGeom prst="rect">
             <a:avLst/>
@@ -2282,10 +1994,10 @@
             <a:noAutofit/>
           </a:bodyPr>
           <a:p>
-            <a:endParaRPr b="0" lang="ru-RU" sz="1800" spc="-1" strike="noStrike">
-              <a:solidFill>
-                <a:srgbClr val="000000"/>
-              </a:solidFill>
+            <a:pPr algn="ctr">
+              <a:buNone/>
+            </a:pPr>
+            <a:endParaRPr b="0" lang="ru-RU" sz="4400" spc="-1" strike="noStrike">
               <a:latin typeface="Arial"/>
             </a:endParaRPr>
           </a:p>
@@ -2319,19 +2031,7 @@
             <a:normAutofit/>
           </a:bodyPr>
           <a:p>
-            <a:pPr>
-              <a:lnSpc>
-                <a:spcPct val="90000"/>
-              </a:lnSpc>
-              <a:spcBef>
-                <a:spcPts val="1417"/>
-              </a:spcBef>
-              <a:buNone/>
-            </a:pPr>
-            <a:endParaRPr b="0" lang="ru-RU" sz="2800" spc="-1" strike="noStrike">
-              <a:solidFill>
-                <a:srgbClr val="000000"/>
-              </a:solidFill>
+            <a:endParaRPr b="0" lang="ru-RU" sz="3200" spc="-1" strike="noStrike">
               <a:latin typeface="Arial"/>
             </a:endParaRPr>
           </a:p>
@@ -2365,19 +2065,7 @@
             <a:normAutofit/>
           </a:bodyPr>
           <a:p>
-            <a:pPr>
-              <a:lnSpc>
-                <a:spcPct val="90000"/>
-              </a:lnSpc>
-              <a:spcBef>
-                <a:spcPts val="1417"/>
-              </a:spcBef>
-              <a:buNone/>
-            </a:pPr>
-            <a:endParaRPr b="0" lang="ru-RU" sz="2800" spc="-1" strike="noStrike">
-              <a:solidFill>
-                <a:srgbClr val="000000"/>
-              </a:solidFill>
+            <a:endParaRPr b="0" lang="ru-RU" sz="3200" spc="-1" strike="noStrike">
               <a:latin typeface="Arial"/>
             </a:endParaRPr>
           </a:p>
@@ -2397,7 +2085,7 @@
         <p:txBody>
           <a:bodyPr/>
           <a:p>
-            <a:fld id="{1F5D30EC-0DBF-4B84-AFC6-92B1A5C8C657}" type="slidenum">
+            <a:fld id="{57E8D561-2D0D-404F-B149-9EF18345A2F3}" type="slidenum">
               <a:t>&lt;#&gt;</a:t>
             </a:fld>
           </a:p>
@@ -2437,8 +2125,8 @@
         </p:nvSpPr>
         <p:spPr>
           <a:xfrm>
-            <a:off x="609480" y="273600"/>
-            <a:ext cx="10972440" cy="1144800"/>
+            <a:off x="609480" y="221040"/>
+            <a:ext cx="10972440" cy="1250280"/>
           </a:xfrm>
           <a:prstGeom prst="rect">
             <a:avLst/>
@@ -2453,10 +2141,10 @@
             <a:noAutofit/>
           </a:bodyPr>
           <a:p>
-            <a:endParaRPr b="0" lang="ru-RU" sz="1800" spc="-1" strike="noStrike">
-              <a:solidFill>
-                <a:srgbClr val="000000"/>
-              </a:solidFill>
+            <a:pPr algn="ctr">
+              <a:buNone/>
+            </a:pPr>
+            <a:endParaRPr b="0" lang="ru-RU" sz="4400" spc="-1" strike="noStrike">
               <a:latin typeface="Arial"/>
             </a:endParaRPr>
           </a:p>
@@ -2490,19 +2178,7 @@
             <a:normAutofit/>
           </a:bodyPr>
           <a:p>
-            <a:pPr>
-              <a:lnSpc>
-                <a:spcPct val="90000"/>
-              </a:lnSpc>
-              <a:spcBef>
-                <a:spcPts val="1417"/>
-              </a:spcBef>
-              <a:buNone/>
-            </a:pPr>
-            <a:endParaRPr b="0" lang="ru-RU" sz="2800" spc="-1" strike="noStrike">
-              <a:solidFill>
-                <a:srgbClr val="000000"/>
-              </a:solidFill>
+            <a:endParaRPr b="0" lang="ru-RU" sz="3200" spc="-1" strike="noStrike">
               <a:latin typeface="Arial"/>
             </a:endParaRPr>
           </a:p>
@@ -2536,19 +2212,7 @@
             <a:normAutofit/>
           </a:bodyPr>
           <a:p>
-            <a:pPr>
-              <a:lnSpc>
-                <a:spcPct val="90000"/>
-              </a:lnSpc>
-              <a:spcBef>
-                <a:spcPts val="1417"/>
-              </a:spcBef>
-              <a:buNone/>
-            </a:pPr>
-            <a:endParaRPr b="0" lang="ru-RU" sz="2800" spc="-1" strike="noStrike">
-              <a:solidFill>
-                <a:srgbClr val="000000"/>
-              </a:solidFill>
+            <a:endParaRPr b="0" lang="ru-RU" sz="3200" spc="-1" strike="noStrike">
               <a:latin typeface="Arial"/>
             </a:endParaRPr>
           </a:p>
@@ -2582,19 +2246,7 @@
             <a:normAutofit/>
           </a:bodyPr>
           <a:p>
-            <a:pPr>
-              <a:lnSpc>
-                <a:spcPct val="90000"/>
-              </a:lnSpc>
-              <a:spcBef>
-                <a:spcPts val="1417"/>
-              </a:spcBef>
-              <a:buNone/>
-            </a:pPr>
-            <a:endParaRPr b="0" lang="ru-RU" sz="2800" spc="-1" strike="noStrike">
-              <a:solidFill>
-                <a:srgbClr val="000000"/>
-              </a:solidFill>
+            <a:endParaRPr b="0" lang="ru-RU" sz="3200" spc="-1" strike="noStrike">
               <a:latin typeface="Arial"/>
             </a:endParaRPr>
           </a:p>
@@ -2628,19 +2280,7 @@
             <a:normAutofit/>
           </a:bodyPr>
           <a:p>
-            <a:pPr>
-              <a:lnSpc>
-                <a:spcPct val="90000"/>
-              </a:lnSpc>
-              <a:spcBef>
-                <a:spcPts val="1417"/>
-              </a:spcBef>
-              <a:buNone/>
-            </a:pPr>
-            <a:endParaRPr b="0" lang="ru-RU" sz="2800" spc="-1" strike="noStrike">
-              <a:solidFill>
-                <a:srgbClr val="000000"/>
-              </a:solidFill>
+            <a:endParaRPr b="0" lang="ru-RU" sz="3200" spc="-1" strike="noStrike">
               <a:latin typeface="Arial"/>
             </a:endParaRPr>
           </a:p>
@@ -2660,7 +2300,7 @@
         <p:txBody>
           <a:bodyPr/>
           <a:p>
-            <a:fld id="{34DE6383-43FD-4767-B790-59082D928AEB}" type="slidenum">
+            <a:fld id="{519B1FC3-E33E-4392-A3A0-8F2A5D1E85FD}" type="slidenum">
               <a:t>&lt;#&gt;</a:t>
             </a:fld>
           </a:p>
@@ -2700,8 +2340,8 @@
         </p:nvSpPr>
         <p:spPr>
           <a:xfrm>
-            <a:off x="609480" y="273600"/>
-            <a:ext cx="10972440" cy="1144800"/>
+            <a:off x="609480" y="221040"/>
+            <a:ext cx="10972440" cy="1250280"/>
           </a:xfrm>
           <a:prstGeom prst="rect">
             <a:avLst/>
@@ -2716,10 +2356,10 @@
             <a:noAutofit/>
           </a:bodyPr>
           <a:p>
-            <a:endParaRPr b="0" lang="ru-RU" sz="1800" spc="-1" strike="noStrike">
-              <a:solidFill>
-                <a:srgbClr val="000000"/>
-              </a:solidFill>
+            <a:pPr algn="ctr">
+              <a:buNone/>
+            </a:pPr>
+            <a:endParaRPr b="0" lang="ru-RU" sz="4400" spc="-1" strike="noStrike">
               <a:latin typeface="Arial"/>
             </a:endParaRPr>
           </a:p>
@@ -2750,22 +2390,10 @@
         </p:spPr>
         <p:txBody>
           <a:bodyPr lIns="0" rIns="0" tIns="0" bIns="0" anchor="t">
-            <a:normAutofit/>
-          </a:bodyPr>
-          <a:p>
-            <a:pPr>
-              <a:lnSpc>
-                <a:spcPct val="90000"/>
-              </a:lnSpc>
-              <a:spcBef>
-                <a:spcPts val="1417"/>
-              </a:spcBef>
-              <a:buNone/>
-            </a:pPr>
-            <a:endParaRPr b="0" lang="ru-RU" sz="2800" spc="-1" strike="noStrike">
-              <a:solidFill>
-                <a:srgbClr val="000000"/>
-              </a:solidFill>
+            <a:normAutofit fontScale="91000"/>
+          </a:bodyPr>
+          <a:p>
+            <a:endParaRPr b="0" lang="ru-RU" sz="3200" spc="-1" strike="noStrike">
               <a:latin typeface="Arial"/>
             </a:endParaRPr>
           </a:p>
@@ -2796,22 +2424,10 @@
         </p:spPr>
         <p:txBody>
           <a:bodyPr lIns="0" rIns="0" tIns="0" bIns="0" anchor="t">
-            <a:normAutofit/>
-          </a:bodyPr>
-          <a:p>
-            <a:pPr>
-              <a:lnSpc>
-                <a:spcPct val="90000"/>
-              </a:lnSpc>
-              <a:spcBef>
-                <a:spcPts val="1417"/>
-              </a:spcBef>
-              <a:buNone/>
-            </a:pPr>
-            <a:endParaRPr b="0" lang="ru-RU" sz="2800" spc="-1" strike="noStrike">
-              <a:solidFill>
-                <a:srgbClr val="000000"/>
-              </a:solidFill>
+            <a:normAutofit fontScale="91000"/>
+          </a:bodyPr>
+          <a:p>
+            <a:endParaRPr b="0" lang="ru-RU" sz="3200" spc="-1" strike="noStrike">
               <a:latin typeface="Arial"/>
             </a:endParaRPr>
           </a:p>
@@ -2842,22 +2458,10 @@
         </p:spPr>
         <p:txBody>
           <a:bodyPr lIns="0" rIns="0" tIns="0" bIns="0" anchor="t">
-            <a:normAutofit/>
-          </a:bodyPr>
-          <a:p>
-            <a:pPr>
-              <a:lnSpc>
-                <a:spcPct val="90000"/>
-              </a:lnSpc>
-              <a:spcBef>
-                <a:spcPts val="1417"/>
-              </a:spcBef>
-              <a:buNone/>
-            </a:pPr>
-            <a:endParaRPr b="0" lang="ru-RU" sz="2800" spc="-1" strike="noStrike">
-              <a:solidFill>
-                <a:srgbClr val="000000"/>
-              </a:solidFill>
+            <a:normAutofit fontScale="91000"/>
+          </a:bodyPr>
+          <a:p>
+            <a:endParaRPr b="0" lang="ru-RU" sz="3200" spc="-1" strike="noStrike">
               <a:latin typeface="Arial"/>
             </a:endParaRPr>
           </a:p>
@@ -2888,22 +2492,10 @@
         </p:spPr>
         <p:txBody>
           <a:bodyPr lIns="0" rIns="0" tIns="0" bIns="0" anchor="t">
-            <a:normAutofit/>
-          </a:bodyPr>
-          <a:p>
-            <a:pPr>
-              <a:lnSpc>
-                <a:spcPct val="90000"/>
-              </a:lnSpc>
-              <a:spcBef>
-                <a:spcPts val="1417"/>
-              </a:spcBef>
-              <a:buNone/>
-            </a:pPr>
-            <a:endParaRPr b="0" lang="ru-RU" sz="2800" spc="-1" strike="noStrike">
-              <a:solidFill>
-                <a:srgbClr val="000000"/>
-              </a:solidFill>
+            <a:normAutofit fontScale="91000"/>
+          </a:bodyPr>
+          <a:p>
+            <a:endParaRPr b="0" lang="ru-RU" sz="3200" spc="-1" strike="noStrike">
               <a:latin typeface="Arial"/>
             </a:endParaRPr>
           </a:p>
@@ -2934,22 +2526,10 @@
         </p:spPr>
         <p:txBody>
           <a:bodyPr lIns="0" rIns="0" tIns="0" bIns="0" anchor="t">
-            <a:normAutofit/>
-          </a:bodyPr>
-          <a:p>
-            <a:pPr>
-              <a:lnSpc>
-                <a:spcPct val="90000"/>
-              </a:lnSpc>
-              <a:spcBef>
-                <a:spcPts val="1417"/>
-              </a:spcBef>
-              <a:buNone/>
-            </a:pPr>
-            <a:endParaRPr b="0" lang="ru-RU" sz="2800" spc="-1" strike="noStrike">
-              <a:solidFill>
-                <a:srgbClr val="000000"/>
-              </a:solidFill>
+            <a:normAutofit fontScale="91000"/>
+          </a:bodyPr>
+          <a:p>
+            <a:endParaRPr b="0" lang="ru-RU" sz="3200" spc="-1" strike="noStrike">
               <a:latin typeface="Arial"/>
             </a:endParaRPr>
           </a:p>
@@ -2980,22 +2560,10 @@
         </p:spPr>
         <p:txBody>
           <a:bodyPr lIns="0" rIns="0" tIns="0" bIns="0" anchor="t">
-            <a:normAutofit/>
-          </a:bodyPr>
-          <a:p>
-            <a:pPr>
-              <a:lnSpc>
-                <a:spcPct val="90000"/>
-              </a:lnSpc>
-              <a:spcBef>
-                <a:spcPts val="1417"/>
-              </a:spcBef>
-              <a:buNone/>
-            </a:pPr>
-            <a:endParaRPr b="0" lang="ru-RU" sz="2800" spc="-1" strike="noStrike">
-              <a:solidFill>
-                <a:srgbClr val="000000"/>
-              </a:solidFill>
+            <a:normAutofit fontScale="91000"/>
+          </a:bodyPr>
+          <a:p>
+            <a:endParaRPr b="0" lang="ru-RU" sz="3200" spc="-1" strike="noStrike">
               <a:latin typeface="Arial"/>
             </a:endParaRPr>
           </a:p>
@@ -3015,7 +2583,7 @@
         <p:txBody>
           <a:bodyPr/>
           <a:p>
-            <a:fld id="{7225FFD1-291C-48DC-B2D8-021CB2E74341}" type="slidenum">
+            <a:fld id="{EB564E1C-2C6F-47E8-AEC4-9B41BF119C8B}" type="slidenum">
               <a:t>&lt;#&gt;</a:t>
             </a:fld>
           </a:p>
@@ -3055,8 +2623,8 @@
         </p:nvSpPr>
         <p:spPr>
           <a:xfrm>
-            <a:off x="609480" y="273600"/>
-            <a:ext cx="10972440" cy="1144800"/>
+            <a:off x="609480" y="221040"/>
+            <a:ext cx="10972440" cy="1250280"/>
           </a:xfrm>
           <a:prstGeom prst="rect">
             <a:avLst/>
@@ -3071,10 +2639,10 @@
             <a:noAutofit/>
           </a:bodyPr>
           <a:p>
-            <a:endParaRPr b="0" lang="ru-RU" sz="1800" spc="-1" strike="noStrike">
-              <a:solidFill>
-                <a:srgbClr val="000000"/>
-              </a:solidFill>
+            <a:pPr algn="ctr">
+              <a:buNone/>
+            </a:pPr>
+            <a:endParaRPr b="0" lang="ru-RU" sz="4400" spc="-1" strike="noStrike">
               <a:latin typeface="Arial"/>
             </a:endParaRPr>
           </a:p>
@@ -3108,19 +2676,7 @@
             <a:normAutofit/>
           </a:bodyPr>
           <a:p>
-            <a:pPr>
-              <a:lnSpc>
-                <a:spcPct val="90000"/>
-              </a:lnSpc>
-              <a:spcBef>
-                <a:spcPts val="1417"/>
-              </a:spcBef>
-              <a:buNone/>
-            </a:pPr>
-            <a:endParaRPr b="0" lang="ru-RU" sz="2800" spc="-1" strike="noStrike">
-              <a:solidFill>
-                <a:srgbClr val="000000"/>
-              </a:solidFill>
+            <a:endParaRPr b="0" lang="ru-RU" sz="3200" spc="-1" strike="noStrike">
               <a:latin typeface="Arial"/>
             </a:endParaRPr>
           </a:p>
@@ -3140,7 +2696,7 @@
         <p:txBody>
           <a:bodyPr/>
           <a:p>
-            <a:fld id="{07837DFD-B1C2-458B-BDE4-119093BAC7D9}" type="slidenum">
+            <a:fld id="{D8F26216-76A5-49A0-951A-5DAC5251DF03}" type="slidenum">
               <a:t>&lt;#&gt;</a:t>
             </a:fld>
           </a:p>
@@ -3180,8 +2736,8 @@
         </p:nvSpPr>
         <p:spPr>
           <a:xfrm>
-            <a:off x="609480" y="273600"/>
-            <a:ext cx="10972440" cy="1144800"/>
+            <a:off x="609480" y="221040"/>
+            <a:ext cx="10972440" cy="1250280"/>
           </a:xfrm>
           <a:prstGeom prst="rect">
             <a:avLst/>
@@ -3196,10 +2752,10 @@
             <a:noAutofit/>
           </a:bodyPr>
           <a:p>
-            <a:endParaRPr b="0" lang="ru-RU" sz="1800" spc="-1" strike="noStrike">
-              <a:solidFill>
-                <a:srgbClr val="000000"/>
-              </a:solidFill>
+            <a:pPr algn="ctr">
+              <a:buNone/>
+            </a:pPr>
+            <a:endParaRPr b="0" lang="ru-RU" sz="4400" spc="-1" strike="noStrike">
               <a:latin typeface="Arial"/>
             </a:endParaRPr>
           </a:p>
@@ -3233,19 +2789,7 @@
             <a:normAutofit/>
           </a:bodyPr>
           <a:p>
-            <a:pPr>
-              <a:lnSpc>
-                <a:spcPct val="90000"/>
-              </a:lnSpc>
-              <a:spcBef>
-                <a:spcPts val="1417"/>
-              </a:spcBef>
-              <a:buNone/>
-            </a:pPr>
-            <a:endParaRPr b="0" lang="ru-RU" sz="2800" spc="-1" strike="noStrike">
-              <a:solidFill>
-                <a:srgbClr val="000000"/>
-              </a:solidFill>
+            <a:endParaRPr b="0" lang="ru-RU" sz="3200" spc="-1" strike="noStrike">
               <a:latin typeface="Arial"/>
             </a:endParaRPr>
           </a:p>
@@ -3279,19 +2823,7 @@
             <a:normAutofit/>
           </a:bodyPr>
           <a:p>
-            <a:pPr>
-              <a:lnSpc>
-                <a:spcPct val="90000"/>
-              </a:lnSpc>
-              <a:spcBef>
-                <a:spcPts val="1417"/>
-              </a:spcBef>
-              <a:buNone/>
-            </a:pPr>
-            <a:endParaRPr b="0" lang="ru-RU" sz="2800" spc="-1" strike="noStrike">
-              <a:solidFill>
-                <a:srgbClr val="000000"/>
-              </a:solidFill>
+            <a:endParaRPr b="0" lang="ru-RU" sz="3200" spc="-1" strike="noStrike">
               <a:latin typeface="Arial"/>
             </a:endParaRPr>
           </a:p>
@@ -3311,7 +2843,7 @@
         <p:txBody>
           <a:bodyPr/>
           <a:p>
-            <a:fld id="{69C1A69C-F645-418D-AA31-3FD08509399F}" type="slidenum">
+            <a:fld id="{5F204F0D-FE8B-4251-9E4E-82AB4C0A0D64}" type="slidenum">
               <a:t>&lt;#&gt;</a:t>
             </a:fld>
           </a:p>
@@ -3351,8 +2883,8 @@
         </p:nvSpPr>
         <p:spPr>
           <a:xfrm>
-            <a:off x="609480" y="273600"/>
-            <a:ext cx="10972440" cy="1144800"/>
+            <a:off x="609480" y="221040"/>
+            <a:ext cx="10972440" cy="1250280"/>
           </a:xfrm>
           <a:prstGeom prst="rect">
             <a:avLst/>
@@ -3367,10 +2899,10 @@
             <a:noAutofit/>
           </a:bodyPr>
           <a:p>
-            <a:endParaRPr b="0" lang="ru-RU" sz="1800" spc="-1" strike="noStrike">
-              <a:solidFill>
-                <a:srgbClr val="000000"/>
-              </a:solidFill>
+            <a:pPr algn="ctr">
+              <a:buNone/>
+            </a:pPr>
+            <a:endParaRPr b="0" lang="ru-RU" sz="4400" spc="-1" strike="noStrike">
               <a:latin typeface="Arial"/>
             </a:endParaRPr>
           </a:p>
@@ -3390,7 +2922,7 @@
         <p:txBody>
           <a:bodyPr/>
           <a:p>
-            <a:fld id="{D7B3D744-3915-45B7-8A56-CBCDBC908F96}" type="slidenum">
+            <a:fld id="{89C4759C-6CFB-473C-8BB8-077E3131762F}" type="slidenum">
               <a:t>&lt;#&gt;</a:t>
             </a:fld>
           </a:p>
@@ -3469,7 +3001,7 @@
         <p:txBody>
           <a:bodyPr/>
           <a:p>
-            <a:fld id="{9E8FE9A4-BA67-4A67-9FEB-BB3E9C6FD6C1}" type="slidenum">
+            <a:fld id="{9E79D259-47BE-4777-83C0-9DC0F5DFB1F6}" type="slidenum">
               <a:t>&lt;#&gt;</a:t>
             </a:fld>
           </a:p>
@@ -3509,8 +3041,8 @@
         </p:nvSpPr>
         <p:spPr>
           <a:xfrm>
-            <a:off x="609480" y="273600"/>
-            <a:ext cx="10972440" cy="1144800"/>
+            <a:off x="609480" y="221040"/>
+            <a:ext cx="10972440" cy="1250280"/>
           </a:xfrm>
           <a:prstGeom prst="rect">
             <a:avLst/>
@@ -3525,10 +3057,10 @@
             <a:noAutofit/>
           </a:bodyPr>
           <a:p>
-            <a:endParaRPr b="0" lang="ru-RU" sz="1800" spc="-1" strike="noStrike">
-              <a:solidFill>
-                <a:srgbClr val="000000"/>
-              </a:solidFill>
+            <a:pPr algn="ctr">
+              <a:buNone/>
+            </a:pPr>
+            <a:endParaRPr b="0" lang="ru-RU" sz="4400" spc="-1" strike="noStrike">
               <a:latin typeface="Arial"/>
             </a:endParaRPr>
           </a:p>
@@ -3562,19 +3094,7 @@
             <a:normAutofit/>
           </a:bodyPr>
           <a:p>
-            <a:pPr>
-              <a:lnSpc>
-                <a:spcPct val="90000"/>
-              </a:lnSpc>
-              <a:spcBef>
-                <a:spcPts val="1417"/>
-              </a:spcBef>
-              <a:buNone/>
-            </a:pPr>
-            <a:endParaRPr b="0" lang="ru-RU" sz="2800" spc="-1" strike="noStrike">
-              <a:solidFill>
-                <a:srgbClr val="000000"/>
-              </a:solidFill>
+            <a:endParaRPr b="0" lang="ru-RU" sz="3200" spc="-1" strike="noStrike">
               <a:latin typeface="Arial"/>
             </a:endParaRPr>
           </a:p>
@@ -3608,19 +3128,7 @@
             <a:normAutofit/>
           </a:bodyPr>
           <a:p>
-            <a:pPr>
-              <a:lnSpc>
-                <a:spcPct val="90000"/>
-              </a:lnSpc>
-              <a:spcBef>
-                <a:spcPts val="1417"/>
-              </a:spcBef>
-              <a:buNone/>
-            </a:pPr>
-            <a:endParaRPr b="0" lang="ru-RU" sz="2800" spc="-1" strike="noStrike">
-              <a:solidFill>
-                <a:srgbClr val="000000"/>
-              </a:solidFill>
+            <a:endParaRPr b="0" lang="ru-RU" sz="3200" spc="-1" strike="noStrike">
               <a:latin typeface="Arial"/>
             </a:endParaRPr>
           </a:p>
@@ -3654,19 +3162,7 @@
             <a:normAutofit/>
           </a:bodyPr>
           <a:p>
-            <a:pPr>
-              <a:lnSpc>
-                <a:spcPct val="90000"/>
-              </a:lnSpc>
-              <a:spcBef>
-                <a:spcPts val="1417"/>
-              </a:spcBef>
-              <a:buNone/>
-            </a:pPr>
-            <a:endParaRPr b="0" lang="ru-RU" sz="2800" spc="-1" strike="noStrike">
-              <a:solidFill>
-                <a:srgbClr val="000000"/>
-              </a:solidFill>
+            <a:endParaRPr b="0" lang="ru-RU" sz="3200" spc="-1" strike="noStrike">
               <a:latin typeface="Arial"/>
             </a:endParaRPr>
           </a:p>
@@ -3686,7 +3182,7 @@
         <p:txBody>
           <a:bodyPr/>
           <a:p>
-            <a:fld id="{5790853B-D688-414B-98E5-0EB647672E55}" type="slidenum">
+            <a:fld id="{576F50C0-9FAB-4F14-B862-46209080C007}" type="slidenum">
               <a:t>&lt;#&gt;</a:t>
             </a:fld>
           </a:p>
@@ -3726,8 +3222,8 @@
         </p:nvSpPr>
         <p:spPr>
           <a:xfrm>
-            <a:off x="609480" y="273600"/>
-            <a:ext cx="10972440" cy="1144800"/>
+            <a:off x="609480" y="221040"/>
+            <a:ext cx="10972440" cy="1250280"/>
           </a:xfrm>
           <a:prstGeom prst="rect">
             <a:avLst/>
@@ -3742,10 +3238,10 @@
             <a:noAutofit/>
           </a:bodyPr>
           <a:p>
-            <a:endParaRPr b="0" lang="ru-RU" sz="1800" spc="-1" strike="noStrike">
-              <a:solidFill>
-                <a:srgbClr val="000000"/>
-              </a:solidFill>
+            <a:pPr algn="ctr">
+              <a:buNone/>
+            </a:pPr>
+            <a:endParaRPr b="0" lang="ru-RU" sz="4400" spc="-1" strike="noStrike">
               <a:latin typeface="Arial"/>
             </a:endParaRPr>
           </a:p>
@@ -3779,19 +3275,7 @@
             <a:normAutofit/>
           </a:bodyPr>
           <a:p>
-            <a:pPr>
-              <a:lnSpc>
-                <a:spcPct val="90000"/>
-              </a:lnSpc>
-              <a:spcBef>
-                <a:spcPts val="1417"/>
-              </a:spcBef>
-              <a:buNone/>
-            </a:pPr>
-            <a:endParaRPr b="0" lang="ru-RU" sz="2800" spc="-1" strike="noStrike">
-              <a:solidFill>
-                <a:srgbClr val="000000"/>
-              </a:solidFill>
+            <a:endParaRPr b="0" lang="ru-RU" sz="3200" spc="-1" strike="noStrike">
               <a:latin typeface="Arial"/>
             </a:endParaRPr>
           </a:p>
@@ -3825,19 +3309,7 @@
             <a:normAutofit/>
           </a:bodyPr>
           <a:p>
-            <a:pPr>
-              <a:lnSpc>
-                <a:spcPct val="90000"/>
-              </a:lnSpc>
-              <a:spcBef>
-                <a:spcPts val="1417"/>
-              </a:spcBef>
-              <a:buNone/>
-            </a:pPr>
-            <a:endParaRPr b="0" lang="ru-RU" sz="2800" spc="-1" strike="noStrike">
-              <a:solidFill>
-                <a:srgbClr val="000000"/>
-              </a:solidFill>
+            <a:endParaRPr b="0" lang="ru-RU" sz="3200" spc="-1" strike="noStrike">
               <a:latin typeface="Arial"/>
             </a:endParaRPr>
           </a:p>
@@ -3871,19 +3343,7 @@
             <a:normAutofit/>
           </a:bodyPr>
           <a:p>
-            <a:pPr>
-              <a:lnSpc>
-                <a:spcPct val="90000"/>
-              </a:lnSpc>
-              <a:spcBef>
-                <a:spcPts val="1417"/>
-              </a:spcBef>
-              <a:buNone/>
-            </a:pPr>
-            <a:endParaRPr b="0" lang="ru-RU" sz="2800" spc="-1" strike="noStrike">
-              <a:solidFill>
-                <a:srgbClr val="000000"/>
-              </a:solidFill>
+            <a:endParaRPr b="0" lang="ru-RU" sz="3200" spc="-1" strike="noStrike">
               <a:latin typeface="Arial"/>
             </a:endParaRPr>
           </a:p>
@@ -3903,7 +3363,7 @@
         <p:txBody>
           <a:bodyPr/>
           <a:p>
-            <a:fld id="{D3CED2B0-3EAA-42AE-AF82-09A4834F575B}" type="slidenum">
+            <a:fld id="{85E1773A-112E-4A03-A948-4D790FD9DCFE}" type="slidenum">
               <a:t>&lt;#&gt;</a:t>
             </a:fld>
           </a:p>
@@ -3943,8 +3403,8 @@
         </p:nvSpPr>
         <p:spPr>
           <a:xfrm>
-            <a:off x="609480" y="273600"/>
-            <a:ext cx="10972440" cy="1144800"/>
+            <a:off x="609480" y="221040"/>
+            <a:ext cx="10972440" cy="1250280"/>
           </a:xfrm>
           <a:prstGeom prst="rect">
             <a:avLst/>
@@ -3959,10 +3419,10 @@
             <a:noAutofit/>
           </a:bodyPr>
           <a:p>
-            <a:endParaRPr b="0" lang="ru-RU" sz="1800" spc="-1" strike="noStrike">
-              <a:solidFill>
-                <a:srgbClr val="000000"/>
-              </a:solidFill>
+            <a:pPr algn="ctr">
+              <a:buNone/>
+            </a:pPr>
+            <a:endParaRPr b="0" lang="ru-RU" sz="4400" spc="-1" strike="noStrike">
               <a:latin typeface="Arial"/>
             </a:endParaRPr>
           </a:p>
@@ -3996,19 +3456,7 @@
             <a:normAutofit/>
           </a:bodyPr>
           <a:p>
-            <a:pPr>
-              <a:lnSpc>
-                <a:spcPct val="90000"/>
-              </a:lnSpc>
-              <a:spcBef>
-                <a:spcPts val="1417"/>
-              </a:spcBef>
-              <a:buNone/>
-            </a:pPr>
-            <a:endParaRPr b="0" lang="ru-RU" sz="2800" spc="-1" strike="noStrike">
-              <a:solidFill>
-                <a:srgbClr val="000000"/>
-              </a:solidFill>
+            <a:endParaRPr b="0" lang="ru-RU" sz="3200" spc="-1" strike="noStrike">
               <a:latin typeface="Arial"/>
             </a:endParaRPr>
           </a:p>
@@ -4042,19 +3490,7 @@
             <a:normAutofit/>
           </a:bodyPr>
           <a:p>
-            <a:pPr>
-              <a:lnSpc>
-                <a:spcPct val="90000"/>
-              </a:lnSpc>
-              <a:spcBef>
-                <a:spcPts val="1417"/>
-              </a:spcBef>
-              <a:buNone/>
-            </a:pPr>
-            <a:endParaRPr b="0" lang="ru-RU" sz="2800" spc="-1" strike="noStrike">
-              <a:solidFill>
-                <a:srgbClr val="000000"/>
-              </a:solidFill>
+            <a:endParaRPr b="0" lang="ru-RU" sz="3200" spc="-1" strike="noStrike">
               <a:latin typeface="Arial"/>
             </a:endParaRPr>
           </a:p>
@@ -4088,19 +3524,7 @@
             <a:normAutofit/>
           </a:bodyPr>
           <a:p>
-            <a:pPr>
-              <a:lnSpc>
-                <a:spcPct val="90000"/>
-              </a:lnSpc>
-              <a:spcBef>
-                <a:spcPts val="1417"/>
-              </a:spcBef>
-              <a:buNone/>
-            </a:pPr>
-            <a:endParaRPr b="0" lang="ru-RU" sz="2800" spc="-1" strike="noStrike">
-              <a:solidFill>
-                <a:srgbClr val="000000"/>
-              </a:solidFill>
+            <a:endParaRPr b="0" lang="ru-RU" sz="3200" spc="-1" strike="noStrike">
               <a:latin typeface="Arial"/>
             </a:endParaRPr>
           </a:p>
@@ -4120,7 +3544,7 @@
         <p:txBody>
           <a:bodyPr/>
           <a:p>
-            <a:fld id="{C4B8E04C-D203-432C-9050-81306450C0F9}" type="slidenum">
+            <a:fld id="{6572B547-F8C6-4F56-A70C-B026D5DF78A8}" type="slidenum">
               <a:t>&lt;#&gt;</a:t>
             </a:fld>
           </a:p>
@@ -4162,314 +3586,13 @@
             <a:spLocks noGrp="1"/>
           </p:cNvSpPr>
           <p:nvPr>
-            <p:ph type="title"/>
-          </p:nvPr>
-        </p:nvSpPr>
-        <p:spPr>
-          <a:xfrm>
-            <a:off x="838080" y="365040"/>
-            <a:ext cx="10514520" cy="1324440"/>
-          </a:xfrm>
-          <a:prstGeom prst="rect">
-            <a:avLst/>
-          </a:prstGeom>
-          <a:noFill/>
-          <a:ln w="0">
-            <a:noFill/>
-          </a:ln>
-        </p:spPr>
-        <p:txBody>
-          <a:bodyPr lIns="0" rIns="0" tIns="0" bIns="0" anchor="ctr">
-            <a:noAutofit/>
-          </a:bodyPr>
-          <a:p>
-            <a:r>
-              <a:rPr b="0" lang="ru-RU" sz="4400" spc="-1" strike="noStrike">
-                <a:solidFill>
-                  <a:srgbClr val="000000"/>
-                </a:solidFill>
-                <a:latin typeface="Arial"/>
-              </a:rPr>
-              <a:t>Для правки текста заглавия </a:t>
-            </a:r>
-            <a:r>
-              <a:rPr b="0" lang="ru-RU" sz="4400" spc="-1" strike="noStrike">
-                <a:solidFill>
-                  <a:srgbClr val="000000"/>
-                </a:solidFill>
-                <a:latin typeface="Arial"/>
-              </a:rPr>
-              <a:t>щёлкните мышью</a:t>
-            </a:r>
-            <a:endParaRPr b="0" lang="ru-RU" sz="4400" spc="-1" strike="noStrike">
-              <a:solidFill>
-                <a:srgbClr val="000000"/>
-              </a:solidFill>
-              <a:latin typeface="Arial"/>
-            </a:endParaRPr>
-          </a:p>
-        </p:txBody>
-      </p:sp>
-      <p:sp>
-        <p:nvSpPr>
-          <p:cNvPr id="1" name="PlaceHolder 2"/>
-          <p:cNvSpPr>
-            <a:spLocks noGrp="1"/>
-          </p:cNvSpPr>
-          <p:nvPr>
-            <p:ph type="body"/>
-          </p:nvPr>
-        </p:nvSpPr>
-        <p:spPr>
-          <a:xfrm>
-            <a:off x="838080" y="1825560"/>
-            <a:ext cx="10514520" cy="4350240"/>
-          </a:xfrm>
-          <a:prstGeom prst="rect">
-            <a:avLst/>
-          </a:prstGeom>
-          <a:noFill/>
-          <a:ln w="0">
-            <a:noFill/>
-          </a:ln>
-        </p:spPr>
-        <p:txBody>
-          <a:bodyPr lIns="0" rIns="0" tIns="0" bIns="0" anchor="t">
-            <a:normAutofit/>
-          </a:bodyPr>
-          <a:p>
-            <a:pPr marL="432000" indent="-324000">
-              <a:lnSpc>
-                <a:spcPct val="90000"/>
-              </a:lnSpc>
-              <a:spcBef>
-                <a:spcPts val="1417"/>
-              </a:spcBef>
-              <a:buClr>
-                <a:srgbClr val="000000"/>
-              </a:buClr>
-              <a:buSzPct val="45000"/>
-              <a:buFont typeface="Wingdings" charset="2"/>
-              <a:buChar char=""/>
-            </a:pPr>
-            <a:r>
-              <a:rPr b="0" lang="ru-RU" sz="2800" spc="-1" strike="noStrike">
-                <a:solidFill>
-                  <a:srgbClr val="000000"/>
-                </a:solidFill>
-                <a:latin typeface="Arial"/>
-              </a:rPr>
-              <a:t>Для правки структуры щёлкните мышью</a:t>
-            </a:r>
-            <a:endParaRPr b="0" lang="ru-RU" sz="2800" spc="-1" strike="noStrike">
-              <a:solidFill>
-                <a:srgbClr val="000000"/>
-              </a:solidFill>
-              <a:latin typeface="Arial"/>
-            </a:endParaRPr>
-          </a:p>
-          <a:p>
-            <a:pPr lvl="1" marL="864000" indent="-324000">
-              <a:lnSpc>
-                <a:spcPct val="90000"/>
-              </a:lnSpc>
-              <a:spcBef>
-                <a:spcPts val="1134"/>
-              </a:spcBef>
-              <a:buClr>
-                <a:srgbClr val="000000"/>
-              </a:buClr>
-              <a:buSzPct val="75000"/>
-              <a:buFont typeface="Symbol" charset="2"/>
-              <a:buChar char=""/>
-            </a:pPr>
-            <a:r>
-              <a:rPr b="0" lang="ru-RU" sz="2800" spc="-1" strike="noStrike">
-                <a:solidFill>
-                  <a:srgbClr val="000000"/>
-                </a:solidFill>
-                <a:latin typeface="Arial"/>
-              </a:rPr>
-              <a:t>Второй уровень структуры</a:t>
-            </a:r>
-            <a:endParaRPr b="0" lang="ru-RU" sz="2800" spc="-1" strike="noStrike">
-              <a:solidFill>
-                <a:srgbClr val="000000"/>
-              </a:solidFill>
-              <a:latin typeface="Arial"/>
-            </a:endParaRPr>
-          </a:p>
-          <a:p>
-            <a:pPr lvl="2" marL="1296000" indent="-288000">
-              <a:lnSpc>
-                <a:spcPct val="90000"/>
-              </a:lnSpc>
-              <a:spcBef>
-                <a:spcPts val="850"/>
-              </a:spcBef>
-              <a:buClr>
-                <a:srgbClr val="000000"/>
-              </a:buClr>
-              <a:buSzPct val="45000"/>
-              <a:buFont typeface="Wingdings" charset="2"/>
-              <a:buChar char=""/>
-            </a:pPr>
-            <a:r>
-              <a:rPr b="0" lang="ru-RU" sz="2800" spc="-1" strike="noStrike">
-                <a:solidFill>
-                  <a:srgbClr val="000000"/>
-                </a:solidFill>
-                <a:latin typeface="Arial"/>
-              </a:rPr>
-              <a:t>Третий уровень структуры</a:t>
-            </a:r>
-            <a:endParaRPr b="0" lang="ru-RU" sz="2800" spc="-1" strike="noStrike">
-              <a:solidFill>
-                <a:srgbClr val="000000"/>
-              </a:solidFill>
-              <a:latin typeface="Arial"/>
-            </a:endParaRPr>
-          </a:p>
-          <a:p>
-            <a:pPr lvl="3" marL="1728000" indent="-216000">
-              <a:lnSpc>
-                <a:spcPct val="90000"/>
-              </a:lnSpc>
-              <a:spcBef>
-                <a:spcPts val="567"/>
-              </a:spcBef>
-              <a:buClr>
-                <a:srgbClr val="000000"/>
-              </a:buClr>
-              <a:buSzPct val="75000"/>
-              <a:buFont typeface="Symbol" charset="2"/>
-              <a:buChar char=""/>
-            </a:pPr>
-            <a:r>
-              <a:rPr b="0" lang="ru-RU" sz="2800" spc="-1" strike="noStrike">
-                <a:solidFill>
-                  <a:srgbClr val="000000"/>
-                </a:solidFill>
-                <a:latin typeface="Arial"/>
-              </a:rPr>
-              <a:t>Четвёртый уровень структуры</a:t>
-            </a:r>
-            <a:endParaRPr b="0" lang="ru-RU" sz="2800" spc="-1" strike="noStrike">
-              <a:solidFill>
-                <a:srgbClr val="000000"/>
-              </a:solidFill>
-              <a:latin typeface="Arial"/>
-            </a:endParaRPr>
-          </a:p>
-          <a:p>
-            <a:pPr lvl="4" marL="2160000" indent="-216000">
-              <a:lnSpc>
-                <a:spcPct val="90000"/>
-              </a:lnSpc>
-              <a:spcBef>
-                <a:spcPts val="283"/>
-              </a:spcBef>
-              <a:buClr>
-                <a:srgbClr val="000000"/>
-              </a:buClr>
-              <a:buSzPct val="45000"/>
-              <a:buFont typeface="Wingdings" charset="2"/>
-              <a:buChar char=""/>
-            </a:pPr>
-            <a:r>
-              <a:rPr b="0" lang="ru-RU" sz="2800" spc="-1" strike="noStrike">
-                <a:solidFill>
-                  <a:srgbClr val="000000"/>
-                </a:solidFill>
-                <a:latin typeface="Arial"/>
-              </a:rPr>
-              <a:t>Пятый уровень структуры</a:t>
-            </a:r>
-            <a:endParaRPr b="0" lang="ru-RU" sz="2800" spc="-1" strike="noStrike">
-              <a:solidFill>
-                <a:srgbClr val="000000"/>
-              </a:solidFill>
-              <a:latin typeface="Arial"/>
-            </a:endParaRPr>
-          </a:p>
-          <a:p>
-            <a:pPr lvl="5" marL="2592000" indent="-216000">
-              <a:lnSpc>
-                <a:spcPct val="90000"/>
-              </a:lnSpc>
-              <a:spcBef>
-                <a:spcPts val="283"/>
-              </a:spcBef>
-              <a:buClr>
-                <a:srgbClr val="000000"/>
-              </a:buClr>
-              <a:buSzPct val="45000"/>
-              <a:buFont typeface="Wingdings" charset="2"/>
-              <a:buChar char=""/>
-            </a:pPr>
-            <a:r>
-              <a:rPr b="0" lang="ru-RU" sz="2800" spc="-1" strike="noStrike">
-                <a:solidFill>
-                  <a:srgbClr val="000000"/>
-                </a:solidFill>
-                <a:latin typeface="Arial"/>
-              </a:rPr>
-              <a:t>Шестой уровень структуры</a:t>
-            </a:r>
-            <a:endParaRPr b="0" lang="ru-RU" sz="2800" spc="-1" strike="noStrike">
-              <a:solidFill>
-                <a:srgbClr val="000000"/>
-              </a:solidFill>
-              <a:latin typeface="Arial"/>
-            </a:endParaRPr>
-          </a:p>
-          <a:p>
-            <a:pPr lvl="6" marL="3024000" indent="-216000">
-              <a:lnSpc>
-                <a:spcPct val="90000"/>
-              </a:lnSpc>
-              <a:spcBef>
-                <a:spcPts val="283"/>
-              </a:spcBef>
-              <a:buClr>
-                <a:srgbClr val="000000"/>
-              </a:buClr>
-              <a:buSzPct val="45000"/>
-              <a:buFont typeface="Wingdings" charset="2"/>
-              <a:buChar char=""/>
-            </a:pPr>
-            <a:r>
-              <a:rPr b="0" lang="ru-RU" sz="2800" spc="-1" strike="noStrike">
-                <a:solidFill>
-                  <a:srgbClr val="000000"/>
-                </a:solidFill>
-                <a:latin typeface="Arial"/>
-              </a:rPr>
-              <a:t>Седьмой уровень структуры</a:t>
-            </a:r>
-            <a:endParaRPr b="0" lang="ru-RU" sz="2800" spc="-1" strike="noStrike">
-              <a:solidFill>
-                <a:srgbClr val="000000"/>
-              </a:solidFill>
-              <a:latin typeface="Arial"/>
-            </a:endParaRPr>
-          </a:p>
-        </p:txBody>
-      </p:sp>
-      <p:sp>
-        <p:nvSpPr>
-          <p:cNvPr id="2" name="PlaceHolder 3"/>
-          <p:cNvSpPr>
-            <a:spLocks noGrp="1"/>
-          </p:cNvSpPr>
-          <p:nvPr>
             <p:ph type="sldNum" idx="1"/>
           </p:nvPr>
         </p:nvSpPr>
         <p:spPr>
           <a:xfrm>
             <a:off x="11095200" y="6414840"/>
-            <a:ext cx="257400" cy="247320"/>
+            <a:ext cx="257040" cy="246960"/>
           </a:xfrm>
           <a:prstGeom prst="rect">
             <a:avLst/>
@@ -4505,7 +3628,7 @@
               </a:lnSpc>
               <a:buNone/>
             </a:pPr>
-            <a:fld id="{D6F751EF-5DA9-4D58-A814-74DF877CB43E}" type="slidenum">
+            <a:fld id="{8F43C8B5-E939-4CCC-A685-A028A9871DF6}" type="slidenum">
               <a:rPr b="0" lang="ru-RU" sz="2400" spc="-1" strike="noStrike">
                 <a:solidFill>
                   <a:srgbClr val="000000"/>
@@ -4513,10 +3636,260 @@
                 <a:latin typeface="Times New Roman"/>
                 <a:ea typeface="DejaVu Sans"/>
               </a:rPr>
-              <a:t>&lt;номер&gt;</a:t>
+              <a:t>3</a:t>
             </a:fld>
             <a:endParaRPr b="0" lang="ru-RU" sz="2400" spc="-1" strike="noStrike">
               <a:latin typeface="Times New Roman"/>
+            </a:endParaRPr>
+          </a:p>
+        </p:txBody>
+      </p:sp>
+      <p:sp>
+        <p:nvSpPr>
+          <p:cNvPr id="1" name="PlaceHolder 2"/>
+          <p:cNvSpPr>
+            <a:spLocks noGrp="1"/>
+          </p:cNvSpPr>
+          <p:nvPr>
+            <p:ph type="title"/>
+          </p:nvPr>
+        </p:nvSpPr>
+        <p:spPr>
+          <a:xfrm>
+            <a:off x="609480" y="273600"/>
+            <a:ext cx="10972440" cy="1144800"/>
+          </a:xfrm>
+          <a:prstGeom prst="rect">
+            <a:avLst/>
+          </a:prstGeom>
+          <a:noFill/>
+          <a:ln w="0">
+            <a:noFill/>
+          </a:ln>
+        </p:spPr>
+        <p:txBody>
+          <a:bodyPr lIns="0" rIns="0" tIns="0" bIns="0" anchor="ctr">
+            <a:noAutofit/>
+          </a:bodyPr>
+          <a:p>
+            <a:pPr algn="ctr">
+              <a:buNone/>
+            </a:pPr>
+            <a:r>
+              <a:rPr b="0" lang="ru-RU" sz="4400" spc="-1" strike="noStrike">
+                <a:latin typeface="Arial"/>
+              </a:rPr>
+              <a:t>Для правки </a:t>
+            </a:r>
+            <a:r>
+              <a:rPr b="0" lang="ru-RU" sz="4400" spc="-1" strike="noStrike">
+                <a:latin typeface="Arial"/>
+              </a:rPr>
+              <a:t>текста </a:t>
+            </a:r>
+            <a:r>
+              <a:rPr b="0" lang="ru-RU" sz="4400" spc="-1" strike="noStrike">
+                <a:latin typeface="Arial"/>
+              </a:rPr>
+              <a:t>заглавия </a:t>
+            </a:r>
+            <a:r>
+              <a:rPr b="0" lang="ru-RU" sz="4400" spc="-1" strike="noStrike">
+                <a:latin typeface="Arial"/>
+              </a:rPr>
+              <a:t>щёлкните </a:t>
+            </a:r>
+            <a:r>
+              <a:rPr b="0" lang="ru-RU" sz="4400" spc="-1" strike="noStrike">
+                <a:latin typeface="Arial"/>
+              </a:rPr>
+              <a:t>мышью</a:t>
+            </a:r>
+            <a:endParaRPr b="0" lang="ru-RU" sz="4400" spc="-1" strike="noStrike">
+              <a:latin typeface="Arial"/>
+            </a:endParaRPr>
+          </a:p>
+        </p:txBody>
+      </p:sp>
+      <p:sp>
+        <p:nvSpPr>
+          <p:cNvPr id="2" name="PlaceHolder 3"/>
+          <p:cNvSpPr>
+            <a:spLocks noGrp="1"/>
+          </p:cNvSpPr>
+          <p:nvPr>
+            <p:ph type="body"/>
+          </p:nvPr>
+        </p:nvSpPr>
+        <p:spPr>
+          <a:xfrm>
+            <a:off x="609480" y="1604520"/>
+            <a:ext cx="10972440" cy="3977280"/>
+          </a:xfrm>
+          <a:prstGeom prst="rect">
+            <a:avLst/>
+          </a:prstGeom>
+          <a:noFill/>
+          <a:ln w="0">
+            <a:noFill/>
+          </a:ln>
+        </p:spPr>
+        <p:txBody>
+          <a:bodyPr lIns="0" rIns="0" tIns="0" bIns="0" anchor="t">
+            <a:normAutofit/>
+          </a:bodyPr>
+          <a:p>
+            <a:pPr marL="432000" indent="-324000">
+              <a:spcBef>
+                <a:spcPts val="1417"/>
+              </a:spcBef>
+              <a:buClr>
+                <a:srgbClr val="000000"/>
+              </a:buClr>
+              <a:buSzPct val="45000"/>
+              <a:buFont typeface="Wingdings" charset="2"/>
+              <a:buChar char=""/>
+            </a:pPr>
+            <a:r>
+              <a:rPr b="0" lang="ru-RU" sz="3200" spc="-1" strike="noStrike">
+                <a:latin typeface="Arial"/>
+              </a:rPr>
+              <a:t>Для правки структуры щёлкните мышью</a:t>
+            </a:r>
+            <a:endParaRPr b="0" lang="ru-RU" sz="3200" spc="-1" strike="noStrike">
+              <a:latin typeface="Arial"/>
+            </a:endParaRPr>
+          </a:p>
+          <a:p>
+            <a:pPr lvl="1" marL="864000" indent="-324000">
+              <a:spcBef>
+                <a:spcPts val="1134"/>
+              </a:spcBef>
+              <a:buClr>
+                <a:srgbClr val="000000"/>
+              </a:buClr>
+              <a:buSzPct val="75000"/>
+              <a:buFont typeface="Symbol" charset="2"/>
+              <a:buChar char=""/>
+            </a:pPr>
+            <a:r>
+              <a:rPr b="0" lang="ru-RU" sz="2800" spc="-1" strike="noStrike">
+                <a:latin typeface="Arial"/>
+              </a:rPr>
+              <a:t>Второй уровень структуры</a:t>
+            </a:r>
+            <a:endParaRPr b="0" lang="ru-RU" sz="2800" spc="-1" strike="noStrike">
+              <a:latin typeface="Arial"/>
+            </a:endParaRPr>
+          </a:p>
+          <a:p>
+            <a:pPr lvl="2" marL="1296000" indent="-288000">
+              <a:spcBef>
+                <a:spcPts val="850"/>
+              </a:spcBef>
+              <a:buClr>
+                <a:srgbClr val="000000"/>
+              </a:buClr>
+              <a:buSzPct val="45000"/>
+              <a:buFont typeface="Wingdings" charset="2"/>
+              <a:buChar char=""/>
+            </a:pPr>
+            <a:r>
+              <a:rPr b="0" lang="ru-RU" sz="2400" spc="-1" strike="noStrike">
+                <a:latin typeface="Arial"/>
+              </a:rPr>
+              <a:t>Третий уровень структуры</a:t>
+            </a:r>
+            <a:endParaRPr b="0" lang="ru-RU" sz="2400" spc="-1" strike="noStrike">
+              <a:latin typeface="Arial"/>
+            </a:endParaRPr>
+          </a:p>
+          <a:p>
+            <a:pPr lvl="3" marL="1728000" indent="-216000">
+              <a:spcBef>
+                <a:spcPts val="567"/>
+              </a:spcBef>
+              <a:buClr>
+                <a:srgbClr val="000000"/>
+              </a:buClr>
+              <a:buSzPct val="75000"/>
+              <a:buFont typeface="Symbol" charset="2"/>
+              <a:buChar char=""/>
+            </a:pPr>
+            <a:r>
+              <a:rPr b="0" lang="ru-RU" sz="2000" spc="-1" strike="noStrike">
+                <a:latin typeface="Arial"/>
+              </a:rPr>
+              <a:t>Четвёртый уровень структуры</a:t>
+            </a:r>
+            <a:endParaRPr b="0" lang="ru-RU" sz="2000" spc="-1" strike="noStrike">
+              <a:latin typeface="Arial"/>
+            </a:endParaRPr>
+          </a:p>
+          <a:p>
+            <a:pPr lvl="4" marL="2160000" indent="-216000">
+              <a:spcBef>
+                <a:spcPts val="283"/>
+              </a:spcBef>
+              <a:buClr>
+                <a:srgbClr val="000000"/>
+              </a:buClr>
+              <a:buSzPct val="45000"/>
+              <a:buFont typeface="Wingdings" charset="2"/>
+              <a:buChar char=""/>
+            </a:pPr>
+            <a:r>
+              <a:rPr b="0" lang="ru-RU" sz="2000" spc="-1" strike="noStrike">
+                <a:latin typeface="Arial"/>
+              </a:rPr>
+              <a:t>Пятый уровень структуры</a:t>
+            </a:r>
+            <a:endParaRPr b="0" lang="ru-RU" sz="2000" spc="-1" strike="noStrike">
+              <a:latin typeface="Arial"/>
+            </a:endParaRPr>
+          </a:p>
+          <a:p>
+            <a:pPr lvl="5" marL="2592000" indent="-216000">
+              <a:spcBef>
+                <a:spcPts val="283"/>
+              </a:spcBef>
+              <a:buClr>
+                <a:srgbClr val="000000"/>
+              </a:buClr>
+              <a:buSzPct val="45000"/>
+              <a:buFont typeface="Wingdings" charset="2"/>
+              <a:buChar char=""/>
+            </a:pPr>
+            <a:r>
+              <a:rPr b="0" lang="ru-RU" sz="2000" spc="-1" strike="noStrike">
+                <a:latin typeface="Arial"/>
+              </a:rPr>
+              <a:t>Шестой уровень структуры</a:t>
+            </a:r>
+            <a:endParaRPr b="0" lang="ru-RU" sz="2000" spc="-1" strike="noStrike">
+              <a:latin typeface="Arial"/>
+            </a:endParaRPr>
+          </a:p>
+          <a:p>
+            <a:pPr lvl="6" marL="3024000" indent="-216000">
+              <a:spcBef>
+                <a:spcPts val="283"/>
+              </a:spcBef>
+              <a:buClr>
+                <a:srgbClr val="000000"/>
+              </a:buClr>
+              <a:buSzPct val="45000"/>
+              <a:buFont typeface="Wingdings" charset="2"/>
+              <a:buChar char=""/>
+            </a:pPr>
+            <a:r>
+              <a:rPr b="0" lang="ru-RU" sz="2000" spc="-1" strike="noStrike">
+                <a:latin typeface="Arial"/>
+              </a:rPr>
+              <a:t>Седьмой уровень структуры</a:t>
+            </a:r>
+            <a:endParaRPr b="0" lang="ru-RU" sz="2000" spc="-1" strike="noStrike">
+              <a:latin typeface="Arial"/>
             </a:endParaRPr>
           </a:p>
         </p:txBody>
@@ -4578,7 +3951,7 @@
         <p:spPr>
           <a:xfrm>
             <a:off x="11095200" y="6414840"/>
-            <a:ext cx="257400" cy="247320"/>
+            <a:ext cx="257040" cy="246960"/>
           </a:xfrm>
           <a:prstGeom prst="rect">
             <a:avLst/>
@@ -4614,7 +3987,7 @@
               </a:lnSpc>
               <a:buNone/>
             </a:pPr>
-            <a:fld id="{DEF7C1F4-FED0-4656-81A4-D00AADC64368}" type="slidenum">
+            <a:fld id="{EC0AA4CA-0532-4E8F-8B63-0131F508EE99}" type="slidenum">
               <a:rPr b="0" lang="ru-RU" sz="2400" spc="-1" strike="noStrike">
                 <a:solidFill>
                   <a:srgbClr val="000000"/>
@@ -4658,19 +4031,16 @@
             <a:noAutofit/>
           </a:bodyPr>
           <a:p>
+            <a:pPr algn="ctr">
+              <a:buNone/>
+            </a:pPr>
             <a:r>
-              <a:rPr b="0" lang="ru-RU" sz="1800" spc="-1" strike="noStrike">
-                <a:solidFill>
-                  <a:srgbClr val="000000"/>
-                </a:solidFill>
+              <a:rPr b="0" lang="ru-RU" sz="4400" spc="-1" strike="noStrike">
                 <a:latin typeface="Arial"/>
               </a:rPr>
               <a:t>Для правки текста заглавия щёлкните мышью</a:t>
             </a:r>
-            <a:endParaRPr b="0" lang="ru-RU" sz="1800" spc="-1" strike="noStrike">
-              <a:solidFill>
-                <a:srgbClr val="000000"/>
-              </a:solidFill>
+            <a:endParaRPr b="0" lang="ru-RU" sz="4400" spc="-1" strike="noStrike">
               <a:latin typeface="Arial"/>
             </a:endParaRPr>
           </a:p>
@@ -4705,9 +4075,6 @@
           </a:bodyPr>
           <a:p>
             <a:pPr marL="432000" indent="-324000">
-              <a:lnSpc>
-                <a:spcPct val="90000"/>
-              </a:lnSpc>
               <a:spcBef>
                 <a:spcPts val="1417"/>
               </a:spcBef>
@@ -4719,26 +4086,17 @@
               <a:buChar char=""/>
             </a:pPr>
             <a:r>
-              <a:rPr b="0" lang="ru-RU" sz="2800" spc="-1" strike="noStrike">
-                <a:solidFill>
-                  <a:srgbClr val="000000"/>
-                </a:solidFill>
+              <a:rPr b="0" lang="ru-RU" sz="3200" spc="-1" strike="noStrike">
                 <a:latin typeface="Arial"/>
               </a:rPr>
               <a:t>Для правки структуры щёлкните мышью</a:t>
             </a:r>
-            <a:endParaRPr b="0" lang="ru-RU" sz="2800" spc="-1" strike="noStrike">
-              <a:solidFill>
-                <a:srgbClr val="000000"/>
-              </a:solidFill>
+            <a:endParaRPr b="0" lang="ru-RU" sz="3200" spc="-1" strike="noStrike">
               <a:latin typeface="Arial"/>
             </a:endParaRPr>
           </a:p>
           <a:p>
             <a:pPr lvl="1" marL="864000" indent="-324000">
-              <a:lnSpc>
-                <a:spcPct val="90000"/>
-              </a:lnSpc>
               <a:spcBef>
                 <a:spcPts val="1134"/>
               </a:spcBef>
@@ -4750,26 +4108,17 @@
               <a:buChar char=""/>
             </a:pPr>
             <a:r>
-              <a:rPr b="0" lang="ru-RU" sz="2000" spc="-1" strike="noStrike">
-                <a:solidFill>
-                  <a:srgbClr val="000000"/>
-                </a:solidFill>
+              <a:rPr b="0" lang="ru-RU" sz="2800" spc="-1" strike="noStrike">
                 <a:latin typeface="Arial"/>
               </a:rPr>
               <a:t>Второй уровень структуры</a:t>
             </a:r>
-            <a:endParaRPr b="0" lang="ru-RU" sz="2000" spc="-1" strike="noStrike">
-              <a:solidFill>
-                <a:srgbClr val="000000"/>
-              </a:solidFill>
+            <a:endParaRPr b="0" lang="ru-RU" sz="2800" spc="-1" strike="noStrike">
               <a:latin typeface="Arial"/>
             </a:endParaRPr>
           </a:p>
           <a:p>
             <a:pPr lvl="2" marL="1296000" indent="-288000">
-              <a:lnSpc>
-                <a:spcPct val="90000"/>
-              </a:lnSpc>
               <a:spcBef>
                 <a:spcPts val="850"/>
               </a:spcBef>
@@ -4781,26 +4130,17 @@
               <a:buChar char=""/>
             </a:pPr>
             <a:r>
-              <a:rPr b="0" lang="ru-RU" sz="1800" spc="-1" strike="noStrike">
-                <a:solidFill>
-                  <a:srgbClr val="000000"/>
-                </a:solidFill>
+              <a:rPr b="0" lang="ru-RU" sz="2400" spc="-1" strike="noStrike">
                 <a:latin typeface="Arial"/>
               </a:rPr>
               <a:t>Третий уровень структуры</a:t>
             </a:r>
-            <a:endParaRPr b="0" lang="ru-RU" sz="1800" spc="-1" strike="noStrike">
-              <a:solidFill>
-                <a:srgbClr val="000000"/>
-              </a:solidFill>
+            <a:endParaRPr b="0" lang="ru-RU" sz="2400" spc="-1" strike="noStrike">
               <a:latin typeface="Arial"/>
             </a:endParaRPr>
           </a:p>
           <a:p>
             <a:pPr lvl="3" marL="1728000" indent="-216000">
-              <a:lnSpc>
-                <a:spcPct val="90000"/>
-              </a:lnSpc>
               <a:spcBef>
                 <a:spcPts val="567"/>
               </a:spcBef>
@@ -4812,26 +4152,17 @@
               <a:buChar char=""/>
             </a:pPr>
             <a:r>
-              <a:rPr b="0" lang="ru-RU" sz="1800" spc="-1" strike="noStrike">
-                <a:solidFill>
-                  <a:srgbClr val="000000"/>
-                </a:solidFill>
+              <a:rPr b="0" lang="ru-RU" sz="2000" spc="-1" strike="noStrike">
                 <a:latin typeface="Arial"/>
               </a:rPr>
               <a:t>Четвёртый уровень структуры</a:t>
             </a:r>
-            <a:endParaRPr b="0" lang="ru-RU" sz="1800" spc="-1" strike="noStrike">
-              <a:solidFill>
-                <a:srgbClr val="000000"/>
-              </a:solidFill>
+            <a:endParaRPr b="0" lang="ru-RU" sz="2000" spc="-1" strike="noStrike">
               <a:latin typeface="Arial"/>
             </a:endParaRPr>
           </a:p>
           <a:p>
             <a:pPr lvl="4" marL="2160000" indent="-216000">
-              <a:lnSpc>
-                <a:spcPct val="90000"/>
-              </a:lnSpc>
               <a:spcBef>
                 <a:spcPts val="283"/>
               </a:spcBef>
@@ -4844,25 +4175,16 @@
             </a:pPr>
             <a:r>
               <a:rPr b="0" lang="ru-RU" sz="2000" spc="-1" strike="noStrike">
-                <a:solidFill>
-                  <a:srgbClr val="000000"/>
-                </a:solidFill>
                 <a:latin typeface="Arial"/>
               </a:rPr>
               <a:t>Пятый уровень структуры</a:t>
             </a:r>
             <a:endParaRPr b="0" lang="ru-RU" sz="2000" spc="-1" strike="noStrike">
-              <a:solidFill>
-                <a:srgbClr val="000000"/>
-              </a:solidFill>
               <a:latin typeface="Arial"/>
             </a:endParaRPr>
           </a:p>
           <a:p>
             <a:pPr lvl="5" marL="2592000" indent="-216000">
-              <a:lnSpc>
-                <a:spcPct val="90000"/>
-              </a:lnSpc>
               <a:spcBef>
                 <a:spcPts val="283"/>
               </a:spcBef>
@@ -4875,25 +4197,16 @@
             </a:pPr>
             <a:r>
               <a:rPr b="0" lang="ru-RU" sz="2000" spc="-1" strike="noStrike">
-                <a:solidFill>
-                  <a:srgbClr val="000000"/>
-                </a:solidFill>
                 <a:latin typeface="Arial"/>
               </a:rPr>
               <a:t>Шестой уровень структуры</a:t>
             </a:r>
             <a:endParaRPr b="0" lang="ru-RU" sz="2000" spc="-1" strike="noStrike">
-              <a:solidFill>
-                <a:srgbClr val="000000"/>
-              </a:solidFill>
               <a:latin typeface="Arial"/>
             </a:endParaRPr>
           </a:p>
           <a:p>
             <a:pPr lvl="6" marL="3024000" indent="-216000">
-              <a:lnSpc>
-                <a:spcPct val="90000"/>
-              </a:lnSpc>
               <a:spcBef>
                 <a:spcPts val="283"/>
               </a:spcBef>
@@ -4906,17 +4219,11 @@
             </a:pPr>
             <a:r>
               <a:rPr b="0" lang="ru-RU" sz="2000" spc="-1" strike="noStrike">
-                <a:solidFill>
-                  <a:srgbClr val="000000"/>
-                </a:solidFill>
                 <a:latin typeface="Arial"/>
               </a:rPr>
               <a:t>Седьмой уровень структуры</a:t>
             </a:r>
             <a:endParaRPr b="0" lang="ru-RU" sz="2000" spc="-1" strike="noStrike">
-              <a:solidFill>
-                <a:srgbClr val="000000"/>
-              </a:solidFill>
               <a:latin typeface="Arial"/>
             </a:endParaRPr>
           </a:p>
@@ -4972,7 +4279,7 @@
         <p:spPr>
           <a:xfrm>
             <a:off x="687240" y="3310920"/>
-            <a:ext cx="11217600" cy="1470960"/>
+            <a:ext cx="11217240" cy="1470600"/>
           </a:xfrm>
           <a:prstGeom prst="rect">
             <a:avLst/>
@@ -5020,9 +4327,6 @@
               <a:t>«Разработка базы данных для хранения и обработки данных библиотечной картотеки»</a:t>
             </a:r>
             <a:endParaRPr b="0" lang="ru-RU" sz="3200" spc="-1" strike="noStrike">
-              <a:solidFill>
-                <a:srgbClr val="000000"/>
-              </a:solidFill>
               <a:latin typeface="Arial"/>
             </a:endParaRPr>
           </a:p>
@@ -5041,7 +4345,7 @@
         <p:spPr>
           <a:xfrm>
             <a:off x="9011520" y="6123240"/>
-            <a:ext cx="3133080" cy="651600"/>
+            <a:ext cx="3132720" cy="651240"/>
           </a:xfrm>
           <a:prstGeom prst="rect">
             <a:avLst/>
@@ -5120,7 +4424,7 @@
         <p:spPr>
           <a:xfrm>
             <a:off x="2612520" y="836280"/>
-            <a:ext cx="8451720" cy="1735560"/>
+            <a:ext cx="8451360" cy="1735560"/>
           </a:xfrm>
           <a:prstGeom prst="rect">
             <a:avLst/>
@@ -5247,7 +4551,7 @@
         <p:spPr>
           <a:xfrm>
             <a:off x="5298840" y="6223320"/>
-            <a:ext cx="2001240" cy="400680"/>
+            <a:ext cx="2000880" cy="400320"/>
           </a:xfrm>
           <a:prstGeom prst="rect">
             <a:avLst/>
@@ -5309,7 +4613,7 @@
         <p:spPr>
           <a:xfrm>
             <a:off x="1102680" y="947880"/>
-            <a:ext cx="1291320" cy="1525320"/>
+            <a:ext cx="1290960" cy="1524960"/>
           </a:xfrm>
           <a:prstGeom prst="rect">
             <a:avLst/>
@@ -5362,7 +4666,7 @@
         <p:spPr>
           <a:xfrm>
             <a:off x="824760" y="562320"/>
-            <a:ext cx="10514520" cy="637920"/>
+            <a:ext cx="10514160" cy="637560"/>
           </a:xfrm>
           <a:prstGeom prst="rect">
             <a:avLst/>
@@ -5397,9 +4701,6 @@
               <a:t>Интерфейс программы</a:t>
             </a:r>
             <a:endParaRPr b="0" lang="ru-RU" sz="3600" spc="-1" strike="noStrike">
-              <a:solidFill>
-                <a:srgbClr val="000000"/>
-              </a:solidFill>
               <a:latin typeface="Arial"/>
             </a:endParaRPr>
           </a:p>
@@ -5418,7 +4719,7 @@
         <p:spPr>
           <a:xfrm>
             <a:off x="551520" y="1200960"/>
-            <a:ext cx="2507760" cy="5574600"/>
+            <a:ext cx="2507400" cy="5574240"/>
           </a:xfrm>
           <a:prstGeom prst="rect">
             <a:avLst/>
@@ -5441,7 +4742,7 @@
         <p:spPr>
           <a:xfrm>
             <a:off x="3195360" y="1200960"/>
-            <a:ext cx="2508120" cy="5574960"/>
+            <a:ext cx="2507760" cy="5574600"/>
           </a:xfrm>
           <a:prstGeom prst="rect">
             <a:avLst/>
@@ -5464,7 +4765,7 @@
         <p:spPr>
           <a:xfrm>
             <a:off x="5840640" y="1200960"/>
-            <a:ext cx="2507760" cy="5574960"/>
+            <a:ext cx="2507400" cy="5574600"/>
           </a:xfrm>
           <a:prstGeom prst="rect">
             <a:avLst/>
@@ -5487,7 +4788,7 @@
         <p:spPr>
           <a:xfrm>
             <a:off x="8348760" y="1200960"/>
-            <a:ext cx="2507760" cy="5574600"/>
+            <a:ext cx="2507400" cy="5574240"/>
           </a:xfrm>
           <a:prstGeom prst="rect">
             <a:avLst/>
@@ -5510,7 +4811,7 @@
         <p:spPr>
           <a:xfrm>
             <a:off x="11095200" y="6414840"/>
-            <a:ext cx="458280" cy="247320"/>
+            <a:ext cx="457920" cy="246960"/>
           </a:xfrm>
           <a:prstGeom prst="rect">
             <a:avLst/>
@@ -5546,7 +4847,7 @@
               </a:lnSpc>
               <a:buNone/>
             </a:pPr>
-            <a:fld id="{F680DAC4-38A7-4AF6-B9B3-D47DBF94F46B}" type="slidenum">
+            <a:fld id="{EE0A06C9-D5CF-45F8-85EE-91D3044706D3}" type="slidenum">
               <a:rPr b="0" lang="ru-RU" sz="2400" spc="-1" strike="noStrike">
                 <a:solidFill>
                   <a:srgbClr val="000000"/>
@@ -5605,7 +4906,7 @@
         <p:spPr>
           <a:xfrm>
             <a:off x="824760" y="562320"/>
-            <a:ext cx="10514520" cy="637920"/>
+            <a:ext cx="10514160" cy="637560"/>
           </a:xfrm>
           <a:prstGeom prst="rect">
             <a:avLst/>
@@ -5640,9 +4941,6 @@
               <a:t>Интерфейс программы</a:t>
             </a:r>
             <a:endParaRPr b="0" lang="ru-RU" sz="3600" spc="-1" strike="noStrike">
-              <a:solidFill>
-                <a:srgbClr val="000000"/>
-              </a:solidFill>
               <a:latin typeface="Arial"/>
             </a:endParaRPr>
           </a:p>
@@ -5661,7 +4959,7 @@
         <p:spPr>
           <a:xfrm>
             <a:off x="2158560" y="1284840"/>
-            <a:ext cx="2509920" cy="5579280"/>
+            <a:ext cx="2509560" cy="5578920"/>
           </a:xfrm>
           <a:prstGeom prst="rect">
             <a:avLst/>
@@ -5684,7 +4982,7 @@
         <p:spPr>
           <a:xfrm>
             <a:off x="4828320" y="1284840"/>
-            <a:ext cx="2507760" cy="5574600"/>
+            <a:ext cx="2507400" cy="5574240"/>
           </a:xfrm>
           <a:prstGeom prst="rect">
             <a:avLst/>
@@ -5707,7 +5005,7 @@
         <p:spPr>
           <a:xfrm>
             <a:off x="7495560" y="1200600"/>
-            <a:ext cx="2508120" cy="5574960"/>
+            <a:ext cx="2507760" cy="5574600"/>
           </a:xfrm>
           <a:prstGeom prst="rect">
             <a:avLst/>
@@ -5730,7 +5028,7 @@
         <p:spPr>
           <a:xfrm>
             <a:off x="11095200" y="6414840"/>
-            <a:ext cx="458280" cy="247320"/>
+            <a:ext cx="457920" cy="246960"/>
           </a:xfrm>
           <a:prstGeom prst="rect">
             <a:avLst/>
@@ -5766,7 +5064,7 @@
               </a:lnSpc>
               <a:buNone/>
             </a:pPr>
-            <a:fld id="{33E6DEB4-3A99-4FC5-92DB-1DD282B055A8}" type="slidenum">
+            <a:fld id="{F026DA79-BA2A-45ED-9C43-F8C90FCF869E}" type="slidenum">
               <a:rPr b="0" lang="ru-RU" sz="2400" spc="-1" strike="noStrike">
                 <a:solidFill>
                   <a:srgbClr val="000000"/>
@@ -5825,7 +5123,7 @@
         <p:spPr>
           <a:xfrm>
             <a:off x="824760" y="562320"/>
-            <a:ext cx="10514520" cy="637920"/>
+            <a:ext cx="10514160" cy="637560"/>
           </a:xfrm>
           <a:prstGeom prst="rect">
             <a:avLst/>
@@ -5860,9 +5158,6 @@
               <a:t>Интерфейс программы</a:t>
             </a:r>
             <a:endParaRPr b="0" lang="ru-RU" sz="3600" spc="-1" strike="noStrike">
-              <a:solidFill>
-                <a:srgbClr val="000000"/>
-              </a:solidFill>
               <a:latin typeface="Arial"/>
             </a:endParaRPr>
           </a:p>
@@ -5881,7 +5176,7 @@
         <p:spPr>
           <a:xfrm>
             <a:off x="3449520" y="1283040"/>
-            <a:ext cx="2507760" cy="5574600"/>
+            <a:ext cx="2507400" cy="5574240"/>
           </a:xfrm>
           <a:prstGeom prst="rect">
             <a:avLst/>
@@ -5904,7 +5199,7 @@
         <p:spPr>
           <a:xfrm>
             <a:off x="6234480" y="1282320"/>
-            <a:ext cx="2507760" cy="5574600"/>
+            <a:ext cx="2507400" cy="5574240"/>
           </a:xfrm>
           <a:prstGeom prst="rect">
             <a:avLst/>
@@ -5927,7 +5222,7 @@
         <p:spPr>
           <a:xfrm>
             <a:off x="11095200" y="6414840"/>
-            <a:ext cx="515520" cy="247320"/>
+            <a:ext cx="515160" cy="246960"/>
           </a:xfrm>
           <a:prstGeom prst="rect">
             <a:avLst/>
@@ -5963,7 +5258,7 @@
               </a:lnSpc>
               <a:buNone/>
             </a:pPr>
-            <a:fld id="{00239B49-A74B-4FDE-B8A1-81F27E88A9FA}" type="slidenum">
+            <a:fld id="{D04C4E2A-3861-4EC3-8A19-56D08A700B69}" type="slidenum">
               <a:rPr b="0" lang="ru-RU" sz="2400" spc="-1" strike="noStrike">
                 <a:solidFill>
                   <a:srgbClr val="000000"/>
@@ -6022,7 +5317,7 @@
         <p:spPr>
           <a:xfrm>
             <a:off x="824760" y="562320"/>
-            <a:ext cx="10514520" cy="637920"/>
+            <a:ext cx="10514160" cy="637560"/>
           </a:xfrm>
           <a:prstGeom prst="rect">
             <a:avLst/>
@@ -6057,9 +5352,6 @@
               <a:t>Интерфейс программы</a:t>
             </a:r>
             <a:endParaRPr b="0" lang="ru-RU" sz="3600" spc="-1" strike="noStrike">
-              <a:solidFill>
-                <a:srgbClr val="000000"/>
-              </a:solidFill>
               <a:latin typeface="Arial"/>
             </a:endParaRPr>
           </a:p>
@@ -6078,7 +5370,7 @@
         <p:spPr>
           <a:xfrm>
             <a:off x="2164680" y="1282680"/>
-            <a:ext cx="2508120" cy="5574960"/>
+            <a:ext cx="2507760" cy="5574600"/>
           </a:xfrm>
           <a:prstGeom prst="rect">
             <a:avLst/>
@@ -6101,7 +5393,7 @@
         <p:spPr>
           <a:xfrm>
             <a:off x="4841640" y="1282680"/>
-            <a:ext cx="2508120" cy="5574960"/>
+            <a:ext cx="2507760" cy="5574600"/>
           </a:xfrm>
           <a:prstGeom prst="rect">
             <a:avLst/>
@@ -6124,7 +5416,7 @@
         <p:spPr>
           <a:xfrm>
             <a:off x="7518960" y="1283040"/>
-            <a:ext cx="2507760" cy="5574600"/>
+            <a:ext cx="2507400" cy="5574240"/>
           </a:xfrm>
           <a:prstGeom prst="rect">
             <a:avLst/>
@@ -6147,7 +5439,7 @@
         <p:spPr>
           <a:xfrm>
             <a:off x="11095200" y="6414840"/>
-            <a:ext cx="515520" cy="247320"/>
+            <a:ext cx="515160" cy="246960"/>
           </a:xfrm>
           <a:prstGeom prst="rect">
             <a:avLst/>
@@ -6183,7 +5475,7 @@
               </a:lnSpc>
               <a:buNone/>
             </a:pPr>
-            <a:fld id="{8D3BC861-40D3-4249-9733-7ECDA44D58E5}" type="slidenum">
+            <a:fld id="{9777FEE2-6F95-4F71-B426-AAF856B2FE75}" type="slidenum">
               <a:rPr b="0" lang="ru-RU" sz="2400" spc="-1" strike="noStrike">
                 <a:solidFill>
                   <a:srgbClr val="000000"/>
@@ -6242,7 +5534,7 @@
         <p:spPr>
           <a:xfrm>
             <a:off x="838080" y="562320"/>
-            <a:ext cx="10514520" cy="749520"/>
+            <a:ext cx="10514160" cy="749160"/>
           </a:xfrm>
           <a:prstGeom prst="rect">
             <a:avLst/>
@@ -6277,9 +5569,6 @@
               <a:t>Исследование</a:t>
             </a:r>
             <a:endParaRPr b="0" lang="ru-RU" sz="3600" spc="-1" strike="noStrike">
-              <a:solidFill>
-                <a:srgbClr val="000000"/>
-              </a:solidFill>
               <a:latin typeface="Arial"/>
             </a:endParaRPr>
           </a:p>
@@ -6298,7 +5587,7 @@
         <p:spPr>
           <a:xfrm>
             <a:off x="1412280" y="1238400"/>
-            <a:ext cx="9366120" cy="5619240"/>
+            <a:ext cx="9365760" cy="5618880"/>
           </a:xfrm>
           <a:prstGeom prst="rect">
             <a:avLst/>
@@ -6321,7 +5610,7 @@
         <p:spPr>
           <a:xfrm>
             <a:off x="11095200" y="6414840"/>
-            <a:ext cx="401040" cy="247320"/>
+            <a:ext cx="400680" cy="246960"/>
           </a:xfrm>
           <a:prstGeom prst="rect">
             <a:avLst/>
@@ -6357,7 +5646,7 @@
               </a:lnSpc>
               <a:buNone/>
             </a:pPr>
-            <a:fld id="{7155D695-A6C5-4141-BBD8-6C7E445B3726}" type="slidenum">
+            <a:fld id="{109443E2-B163-4287-B0F5-00426DFFF4A6}" type="slidenum">
               <a:rPr b="0" lang="ru-RU" sz="2400" spc="-1" strike="noStrike">
                 <a:solidFill>
                   <a:srgbClr val="000000"/>
@@ -6416,7 +5705,7 @@
         <p:spPr>
           <a:xfrm>
             <a:off x="838080" y="562320"/>
-            <a:ext cx="10514520" cy="607680"/>
+            <a:ext cx="10514160" cy="607320"/>
           </a:xfrm>
           <a:prstGeom prst="rect">
             <a:avLst/>
@@ -6451,9 +5740,6 @@
               <a:t>Заключение</a:t>
             </a:r>
             <a:endParaRPr b="0" lang="ru-RU" sz="3600" spc="-1" strike="noStrike">
-              <a:solidFill>
-                <a:srgbClr val="000000"/>
-              </a:solidFill>
               <a:latin typeface="Arial"/>
             </a:endParaRPr>
           </a:p>
@@ -6472,7 +5758,7 @@
         <p:spPr>
           <a:xfrm>
             <a:off x="838080" y="1563840"/>
-            <a:ext cx="10514520" cy="4740480"/>
+            <a:ext cx="10514160" cy="4740120"/>
           </a:xfrm>
           <a:prstGeom prst="rect">
             <a:avLst/>
@@ -6510,9 +5796,6 @@
               <a:t>В ходе выполнения курсовой работы была разработана база данных для хранения и обработки данных библиотечной картотеки, а также приложение для доступа к ней.</a:t>
             </a:r>
             <a:endParaRPr b="0" lang="ru-RU" sz="2000" spc="-1" strike="noStrike">
-              <a:solidFill>
-                <a:srgbClr val="000000"/>
-              </a:solidFill>
               <a:latin typeface="Arial"/>
             </a:endParaRPr>
           </a:p>
@@ -6530,9 +5813,6 @@
               </a:tabLst>
             </a:pPr>
             <a:endParaRPr b="0" lang="ru-RU" sz="2000" spc="-1" strike="noStrike">
-              <a:solidFill>
-                <a:srgbClr val="000000"/>
-              </a:solidFill>
               <a:latin typeface="Arial"/>
             </a:endParaRPr>
           </a:p>
@@ -6560,9 +5840,6 @@
               <a:t>В процессе выполнения курсовой работы были решены следующие задачи:</a:t>
             </a:r>
             <a:endParaRPr b="0" lang="ru-RU" sz="2000" spc="-1" strike="noStrike">
-              <a:solidFill>
-                <a:srgbClr val="000000"/>
-              </a:solidFill>
               <a:latin typeface="Arial"/>
             </a:endParaRPr>
           </a:p>
@@ -6594,9 +5871,6 @@
               <a:t>Проведен анализ существующих библиотечных сервисов;</a:t>
             </a:r>
             <a:endParaRPr b="0" lang="ru-RU" sz="2000" spc="-1" strike="noStrike">
-              <a:solidFill>
-                <a:srgbClr val="000000"/>
-              </a:solidFill>
               <a:latin typeface="Arial"/>
             </a:endParaRPr>
           </a:p>
@@ -6628,9 +5902,6 @@
               <a:t>Определены требования к базе данных и программному обеспечению;</a:t>
             </a:r>
             <a:endParaRPr b="0" lang="ru-RU" sz="2000" spc="-1" strike="noStrike">
-              <a:solidFill>
-                <a:srgbClr val="000000"/>
-              </a:solidFill>
               <a:latin typeface="Arial"/>
             </a:endParaRPr>
           </a:p>
@@ -6662,9 +5933,6 @@
               <a:t>Спроектированы сущности базы данных и заданы их ограничения;</a:t>
             </a:r>
             <a:endParaRPr b="0" lang="ru-RU" sz="2000" spc="-1" strike="noStrike">
-              <a:solidFill>
-                <a:srgbClr val="000000"/>
-              </a:solidFill>
               <a:latin typeface="Arial"/>
             </a:endParaRPr>
           </a:p>
@@ -6696,9 +5964,6 @@
               <a:t>Выбраны инструменты для реализации базы данных и программного обеспечения;</a:t>
             </a:r>
             <a:endParaRPr b="0" lang="ru-RU" sz="2000" spc="-1" strike="noStrike">
-              <a:solidFill>
-                <a:srgbClr val="000000"/>
-              </a:solidFill>
               <a:latin typeface="Arial"/>
             </a:endParaRPr>
           </a:p>
@@ -6730,9 +5995,6 @@
               <a:t>Реализованы база данных и программное обеспечение для работы с ней;</a:t>
             </a:r>
             <a:endParaRPr b="0" lang="ru-RU" sz="2000" spc="-1" strike="noStrike">
-              <a:solidFill>
-                <a:srgbClr val="000000"/>
-              </a:solidFill>
               <a:latin typeface="Arial"/>
             </a:endParaRPr>
           </a:p>
@@ -6764,9 +6026,6 @@
               <a:t>Проведено исследование на основе разработанной базы данных;</a:t>
             </a:r>
             <a:endParaRPr b="0" lang="ru-RU" sz="2000" spc="-1" strike="noStrike">
-              <a:solidFill>
-                <a:srgbClr val="000000"/>
-              </a:solidFill>
               <a:latin typeface="Arial"/>
             </a:endParaRPr>
           </a:p>
@@ -6785,7 +6044,7 @@
         <p:spPr>
           <a:xfrm>
             <a:off x="11095200" y="6414840"/>
-            <a:ext cx="524880" cy="247320"/>
+            <a:ext cx="524520" cy="246960"/>
           </a:xfrm>
           <a:prstGeom prst="rect">
             <a:avLst/>
@@ -6821,7 +6080,7 @@
               </a:lnSpc>
               <a:buNone/>
             </a:pPr>
-            <a:fld id="{1515164A-6F4A-4907-821D-361717CCFB70}" type="slidenum">
+            <a:fld id="{15E36A8A-892B-4EE8-BB19-E2CBC5171448}" type="slidenum">
               <a:rPr b="0" lang="ru-RU" sz="2400" spc="-1" strike="noStrike">
                 <a:solidFill>
                   <a:srgbClr val="000000"/>
@@ -6880,7 +6139,7 @@
         <p:spPr>
           <a:xfrm>
             <a:off x="824760" y="562320"/>
-            <a:ext cx="10514520" cy="625320"/>
+            <a:ext cx="10514160" cy="624960"/>
           </a:xfrm>
           <a:prstGeom prst="rect">
             <a:avLst/>
@@ -6915,9 +6174,6 @@
               <a:t>Цель и задачи</a:t>
             </a:r>
             <a:endParaRPr b="0" lang="ru-RU" sz="3600" spc="-1" strike="noStrike">
-              <a:solidFill>
-                <a:srgbClr val="000000"/>
-              </a:solidFill>
               <a:latin typeface="Arial"/>
             </a:endParaRPr>
           </a:p>
@@ -6936,7 +6192,7 @@
         <p:spPr>
           <a:xfrm>
             <a:off x="838080" y="1831680"/>
-            <a:ext cx="10514520" cy="4523400"/>
+            <a:ext cx="10514160" cy="4523040"/>
           </a:xfrm>
           <a:prstGeom prst="rect">
             <a:avLst/>
@@ -6984,9 +6240,6 @@
               <a:t> данной курсовой работы является разработка базы данных для хранения и обработки данных библиотечной картотеки</a:t>
             </a:r>
             <a:endParaRPr b="0" lang="ru-RU" sz="2000" spc="-1" strike="noStrike">
-              <a:solidFill>
-                <a:srgbClr val="000000"/>
-              </a:solidFill>
               <a:latin typeface="Arial"/>
             </a:endParaRPr>
           </a:p>
@@ -7014,9 +6267,6 @@
               <a:t>Задачи:</a:t>
             </a:r>
             <a:endParaRPr b="0" lang="ru-RU" sz="2000" spc="-1" strike="noStrike">
-              <a:solidFill>
-                <a:srgbClr val="000000"/>
-              </a:solidFill>
               <a:latin typeface="Arial"/>
             </a:endParaRPr>
           </a:p>
@@ -7048,9 +6298,6 @@
               <a:t>провести анализ существующих библиотечных сервисов;</a:t>
             </a:r>
             <a:endParaRPr b="0" lang="ru-RU" sz="2000" spc="-1" strike="noStrike">
-              <a:solidFill>
-                <a:srgbClr val="000000"/>
-              </a:solidFill>
               <a:latin typeface="Arial"/>
             </a:endParaRPr>
           </a:p>
@@ -7082,9 +6329,6 @@
               <a:t>определить требования к базе данных и программному обеспечению;</a:t>
             </a:r>
             <a:endParaRPr b="0" lang="ru-RU" sz="2000" spc="-1" strike="noStrike">
-              <a:solidFill>
-                <a:srgbClr val="000000"/>
-              </a:solidFill>
               <a:latin typeface="Arial"/>
             </a:endParaRPr>
           </a:p>
@@ -7116,9 +6360,6 @@
               <a:t>спроектировать сущности базы данных и задать их ограничения;</a:t>
             </a:r>
             <a:endParaRPr b="0" lang="ru-RU" sz="2000" spc="-1" strike="noStrike">
-              <a:solidFill>
-                <a:srgbClr val="000000"/>
-              </a:solidFill>
               <a:latin typeface="Arial"/>
             </a:endParaRPr>
           </a:p>
@@ -7150,9 +6391,6 @@
               <a:t>выбрать инструменты для реализации базы данных и программного обеспечения;</a:t>
             </a:r>
             <a:endParaRPr b="0" lang="ru-RU" sz="2000" spc="-1" strike="noStrike">
-              <a:solidFill>
-                <a:srgbClr val="000000"/>
-              </a:solidFill>
               <a:latin typeface="Arial"/>
             </a:endParaRPr>
           </a:p>
@@ -7184,9 +6422,6 @@
               <a:t>реализовать базу данных и программное обеспечение для доступа к ней;</a:t>
             </a:r>
             <a:endParaRPr b="0" lang="ru-RU" sz="2000" spc="-1" strike="noStrike">
-              <a:solidFill>
-                <a:srgbClr val="000000"/>
-              </a:solidFill>
               <a:latin typeface="Arial"/>
             </a:endParaRPr>
           </a:p>
@@ -7218,9 +6453,6 @@
               <a:t>провести исследование на основе разработанной базы данных.</a:t>
             </a:r>
             <a:endParaRPr b="0" lang="ru-RU" sz="2000" spc="-1" strike="noStrike">
-              <a:solidFill>
-                <a:srgbClr val="000000"/>
-              </a:solidFill>
               <a:latin typeface="Arial"/>
             </a:endParaRPr>
           </a:p>
@@ -7240,7 +6472,7 @@
         <p:txBody>
           <a:bodyPr/>
           <a:p>
-            <a:fld id="{63D78418-2C5F-47FD-A1A0-B31F15D942D3}" type="slidenum">
+            <a:fld id="{FC34D516-7873-43AD-8258-97D4E19EEB81}" type="slidenum">
               <a:t>2</a:t>
             </a:fld>
           </a:p>
@@ -7289,7 +6521,7 @@
         <p:spPr>
           <a:xfrm>
             <a:off x="720000" y="562320"/>
-            <a:ext cx="10514520" cy="749520"/>
+            <a:ext cx="10514160" cy="749160"/>
           </a:xfrm>
           <a:prstGeom prst="rect">
             <a:avLst/>
@@ -7324,9 +6556,6 @@
               <a:t>Диаграмма сущность-связь</a:t>
             </a:r>
             <a:endParaRPr b="0" lang="ru-RU" sz="3600" spc="-1" strike="noStrike">
-              <a:solidFill>
-                <a:srgbClr val="000000"/>
-              </a:solidFill>
               <a:latin typeface="Arial"/>
             </a:endParaRPr>
           </a:p>
@@ -7334,7 +6563,7 @@
       </p:sp>
       <p:pic>
         <p:nvPicPr>
-          <p:cNvPr id="86" name="Рисунок 85" descr=""/>
+          <p:cNvPr id="86" name="" descr=""/>
           <p:cNvPicPr/>
           <p:nvPr/>
         </p:nvPicPr>
@@ -7344,8 +6573,8 @@
         </p:blipFill>
         <p:spPr>
           <a:xfrm>
-            <a:off x="2506320" y="1240560"/>
-            <a:ext cx="6808680" cy="5617080"/>
+            <a:off x="3054600" y="1410840"/>
+            <a:ext cx="5405400" cy="5443560"/>
           </a:xfrm>
           <a:prstGeom prst="rect">
             <a:avLst/>
@@ -7369,7 +6598,7 @@
         <p:txBody>
           <a:bodyPr/>
           <a:p>
-            <a:fld id="{807BCE87-543F-44B8-B980-C4E0E864FE3A}" type="slidenum">
+            <a:fld id="{76B219E7-0890-49CA-BA58-59897BCAD235}" type="slidenum">
               <a:t>3</a:t>
             </a:fld>
           </a:p>
@@ -7418,7 +6647,7 @@
         <p:spPr>
           <a:xfrm>
             <a:off x="914040" y="562320"/>
-            <a:ext cx="10514520" cy="749520"/>
+            <a:ext cx="10514160" cy="749160"/>
           </a:xfrm>
           <a:prstGeom prst="rect">
             <a:avLst/>
@@ -7453,9 +6682,6 @@
               <a:t>Диаграмма базы данных</a:t>
             </a:r>
             <a:endParaRPr b="0" lang="ru-RU" sz="3600" spc="-1" strike="noStrike">
-              <a:solidFill>
-                <a:srgbClr val="000000"/>
-              </a:solidFill>
               <a:latin typeface="Arial"/>
             </a:endParaRPr>
           </a:p>
@@ -7474,7 +6700,7 @@
         <p:spPr>
           <a:xfrm>
             <a:off x="2340000" y="1304640"/>
-            <a:ext cx="7562880" cy="5355360"/>
+            <a:ext cx="7562520" cy="5355000"/>
           </a:xfrm>
           <a:prstGeom prst="rect">
             <a:avLst/>
@@ -7498,7 +6724,7 @@
         <p:txBody>
           <a:bodyPr/>
           <a:p>
-            <a:fld id="{66BCA68E-D9B3-474E-9509-E2E49514A7E6}" type="slidenum">
+            <a:fld id="{65732C32-176C-4374-A487-773866EB354D}" type="slidenum">
               <a:t>4</a:t>
             </a:fld>
           </a:p>
@@ -7547,7 +6773,7 @@
         <p:spPr>
           <a:xfrm>
             <a:off x="838080" y="562320"/>
-            <a:ext cx="10514520" cy="749520"/>
+            <a:ext cx="10514160" cy="749160"/>
           </a:xfrm>
           <a:prstGeom prst="rect">
             <a:avLst/>
@@ -7582,9 +6808,6 @@
               <a:t>Диаграмма прецедентов</a:t>
             </a:r>
             <a:endParaRPr b="0" lang="ru-RU" sz="3600" spc="-1" strike="noStrike">
-              <a:solidFill>
-                <a:srgbClr val="000000"/>
-              </a:solidFill>
               <a:latin typeface="Arial"/>
             </a:endParaRPr>
           </a:p>
@@ -7603,7 +6826,7 @@
         <p:spPr>
           <a:xfrm>
             <a:off x="3204360" y="1282680"/>
-            <a:ext cx="6364440" cy="5574960"/>
+            <a:ext cx="6364080" cy="5574600"/>
           </a:xfrm>
           <a:prstGeom prst="rect">
             <a:avLst/>
@@ -7627,7 +6850,7 @@
         <p:txBody>
           <a:bodyPr/>
           <a:p>
-            <a:fld id="{1A16FDC4-AEE5-49FC-B972-1F3FD3C1AEEF}" type="slidenum">
+            <a:fld id="{C9E0FCFF-10F3-4598-A490-9CD13FDF1F54}" type="slidenum">
               <a:t>5</a:t>
             </a:fld>
           </a:p>
@@ -7676,7 +6899,7 @@
         <p:spPr>
           <a:xfrm>
             <a:off x="1523880" y="562320"/>
-            <a:ext cx="9142920" cy="666720"/>
+            <a:ext cx="9142560" cy="666360"/>
           </a:xfrm>
           <a:prstGeom prst="rect">
             <a:avLst/>
@@ -7711,9 +6934,6 @@
               <a:t>Схемы функций</a:t>
             </a:r>
             <a:endParaRPr b="0" lang="ru-RU" sz="3600" spc="-1" strike="noStrike">
-              <a:solidFill>
-                <a:srgbClr val="000000"/>
-              </a:solidFill>
               <a:latin typeface="Arial"/>
             </a:endParaRPr>
           </a:p>
@@ -7732,7 +6952,7 @@
         <p:spPr>
           <a:xfrm>
             <a:off x="4790520" y="1229400"/>
-            <a:ext cx="4922280" cy="5610240"/>
+            <a:ext cx="4921920" cy="5609880"/>
           </a:xfrm>
           <a:prstGeom prst="rect">
             <a:avLst/>
@@ -7756,7 +6976,7 @@
         <p:txBody>
           <a:bodyPr/>
           <a:p>
-            <a:fld id="{D0108274-1A1F-469A-BFD7-99080D8E8E9D}" type="slidenum">
+            <a:fld id="{1BA9E70B-6C89-4B69-B1C2-FCEB94431899}" type="slidenum">
               <a:t>6</a:t>
             </a:fld>
           </a:p>
@@ -7805,7 +7025,7 @@
         <p:spPr>
           <a:xfrm>
             <a:off x="1523880" y="562320"/>
-            <a:ext cx="9142920" cy="666720"/>
+            <a:ext cx="9142560" cy="666360"/>
           </a:xfrm>
           <a:prstGeom prst="rect">
             <a:avLst/>
@@ -7840,9 +7060,6 @@
               <a:t>Схемы функций</a:t>
             </a:r>
             <a:endParaRPr b="0" lang="ru-RU" sz="3600" spc="-1" strike="noStrike">
-              <a:solidFill>
-                <a:srgbClr val="000000"/>
-              </a:solidFill>
               <a:latin typeface="Arial"/>
             </a:endParaRPr>
           </a:p>
@@ -7861,7 +7078,7 @@
         <p:spPr>
           <a:xfrm>
             <a:off x="2474280" y="1204200"/>
-            <a:ext cx="8375400" cy="5653440"/>
+            <a:ext cx="8375040" cy="5653080"/>
           </a:xfrm>
           <a:prstGeom prst="rect">
             <a:avLst/>
@@ -7885,7 +7102,7 @@
         <p:txBody>
           <a:bodyPr/>
           <a:p>
-            <a:fld id="{C156B26B-14E5-4BB0-85C4-2A800C01F753}" type="slidenum">
+            <a:fld id="{59DCFA29-1F5D-4664-9BE8-0B033FF984BC}" type="slidenum">
               <a:t>7</a:t>
             </a:fld>
           </a:p>
@@ -7934,7 +7151,7 @@
         <p:spPr>
           <a:xfrm>
             <a:off x="1523880" y="562320"/>
-            <a:ext cx="9142920" cy="666720"/>
+            <a:ext cx="9142560" cy="666360"/>
           </a:xfrm>
           <a:prstGeom prst="rect">
             <a:avLst/>
@@ -7969,9 +7186,6 @@
               <a:t>Схемы функций</a:t>
             </a:r>
             <a:endParaRPr b="0" lang="ru-RU" sz="3600" spc="-1" strike="noStrike">
-              <a:solidFill>
-                <a:srgbClr val="000000"/>
-              </a:solidFill>
               <a:latin typeface="Arial"/>
             </a:endParaRPr>
           </a:p>
@@ -7990,7 +7204,7 @@
         <p:spPr>
           <a:xfrm>
             <a:off x="4710600" y="1300320"/>
-            <a:ext cx="5759280" cy="5557320"/>
+            <a:ext cx="5758920" cy="5556960"/>
           </a:xfrm>
           <a:prstGeom prst="rect">
             <a:avLst/>
@@ -8014,7 +7228,7 @@
         <p:txBody>
           <a:bodyPr/>
           <a:p>
-            <a:fld id="{44A71673-4300-4737-B02A-0ADCE6EFD026}" type="slidenum">
+            <a:fld id="{6438FC06-3095-4E84-9BB2-4E566C527115}" type="slidenum">
               <a:t>8</a:t>
             </a:fld>
           </a:p>
@@ -8063,7 +7277,7 @@
         <p:spPr>
           <a:xfrm>
             <a:off x="838080" y="532080"/>
-            <a:ext cx="10514520" cy="749520"/>
+            <a:ext cx="10514160" cy="749160"/>
           </a:xfrm>
           <a:prstGeom prst="rect">
             <a:avLst/>
@@ -8098,9 +7312,6 @@
               <a:t>Средства реализации</a:t>
             </a:r>
             <a:endParaRPr b="0" lang="ru-RU" sz="3600" spc="-1" strike="noStrike">
-              <a:solidFill>
-                <a:srgbClr val="000000"/>
-              </a:solidFill>
               <a:latin typeface="Arial"/>
             </a:endParaRPr>
           </a:p>
@@ -8119,7 +7330,7 @@
         <p:spPr>
           <a:xfrm>
             <a:off x="838080" y="2575080"/>
-            <a:ext cx="2232000" cy="2256480"/>
+            <a:ext cx="2231640" cy="2256120"/>
           </a:xfrm>
           <a:prstGeom prst="rect">
             <a:avLst/>
@@ -8158,9 +7369,6 @@
               <a:t>Kotlin</a:t>
             </a:r>
             <a:endParaRPr b="0" lang="ru-RU" sz="2000" spc="-1" strike="noStrike">
-              <a:solidFill>
-                <a:srgbClr val="000000"/>
-              </a:solidFill>
               <a:latin typeface="Arial"/>
             </a:endParaRPr>
           </a:p>
@@ -8189,9 +7397,6 @@
               <a:t>PostgresSQL</a:t>
             </a:r>
             <a:endParaRPr b="0" lang="ru-RU" sz="2000" spc="-1" strike="noStrike">
-              <a:solidFill>
-                <a:srgbClr val="000000"/>
-              </a:solidFill>
               <a:latin typeface="Arial"/>
             </a:endParaRPr>
           </a:p>
@@ -8220,9 +7425,6 @@
               <a:t>Exposed</a:t>
             </a:r>
             <a:endParaRPr b="0" lang="ru-RU" sz="2000" spc="-1" strike="noStrike">
-              <a:solidFill>
-                <a:srgbClr val="000000"/>
-              </a:solidFill>
               <a:latin typeface="Arial"/>
             </a:endParaRPr>
           </a:p>
@@ -8251,9 +7453,6 @@
               <a:t>Ktor</a:t>
             </a:r>
             <a:endParaRPr b="0" lang="ru-RU" sz="2000" spc="-1" strike="noStrike">
-              <a:solidFill>
-                <a:srgbClr val="000000"/>
-              </a:solidFill>
               <a:latin typeface="Arial"/>
             </a:endParaRPr>
           </a:p>
@@ -8282,9 +7481,6 @@
               <a:t>Jetpack Compose</a:t>
             </a:r>
             <a:endParaRPr b="0" lang="ru-RU" sz="2000" spc="-1" strike="noStrike">
-              <a:solidFill>
-                <a:srgbClr val="000000"/>
-              </a:solidFill>
               <a:latin typeface="Arial"/>
             </a:endParaRPr>
           </a:p>
@@ -8304,7 +7500,7 @@
         <p:txBody>
           <a:bodyPr/>
           <a:p>
-            <a:fld id="{79102A63-685E-42AC-8D04-07048AF0FFC3}" type="slidenum">
+            <a:fld id="{CB6013D1-7A57-4DB4-9222-93F741E97A12}" type="slidenum">
               <a:t>9</a:t>
             </a:fld>
           </a:p>

</xml_diff>